<commit_message>
add new figure about limit and false positive
</commit_message>
<xml_diff>
--- a/30_Presentation/AntiCrawlerLTM_노인우_20180611.pptx
+++ b/30_Presentation/AntiCrawlerLTM_노인우_20180611.pptx
@@ -6,6 +6,12 @@
   </p:sldMasterIdLst>
   <p:sldIdLst>
     <p:sldId id="256" r:id="rId2"/>
+    <p:sldId id="257" r:id="rId3"/>
+    <p:sldId id="258" r:id="rId4"/>
+    <p:sldId id="259" r:id="rId5"/>
+    <p:sldId id="260" r:id="rId6"/>
+    <p:sldId id="261" r:id="rId7"/>
+    <p:sldId id="262" r:id="rId8"/>
   </p:sldIdLst>
   <p:sldSz cx="12192000" cy="6858000"/>
   <p:notesSz cx="6858000" cy="9144000"/>
@@ -3026,7 +3032,7 @@
           </a:p>
           <a:p>
             <a:r>
-              <a:rPr kumimoji="1" lang="en-US" altLang="ko-KR" smtClean="0"/>
+              <a:rPr kumimoji="1" lang="en-US" altLang="ko-KR" dirty="0" smtClean="0"/>
               <a:t>2018.06.14</a:t>
             </a:r>
             <a:endParaRPr kumimoji="1" lang="ko-KR" altLang="en-US" dirty="0"/>
@@ -3037,6 +3043,736 @@
     <p:extLst>
       <p:ext uri="{BB962C8B-B14F-4D97-AF65-F5344CB8AC3E}">
         <p14:creationId xmlns:p14="http://schemas.microsoft.com/office/powerpoint/2010/main" val="157000168"/>
+      </p:ext>
+    </p:extLst>
+  </p:cSld>
+  <p:clrMapOvr>
+    <a:masterClrMapping/>
+  </p:clrMapOvr>
+</p:sld>
+</file>
+
+<file path=ppt/slides/slide2.xml><?xml version="1.0" encoding="utf-8"?>
+<p:sld xmlns:a="http://schemas.openxmlformats.org/drawingml/2006/main" xmlns:r="http://schemas.openxmlformats.org/officeDocument/2006/relationships" xmlns:p="http://schemas.openxmlformats.org/presentationml/2006/main">
+  <p:cSld>
+    <p:spTree>
+      <p:nvGrpSpPr>
+        <p:cNvPr id="1" name=""/>
+        <p:cNvGrpSpPr/>
+        <p:nvPr/>
+      </p:nvGrpSpPr>
+      <p:grpSpPr>
+        <a:xfrm>
+          <a:off x="0" y="0"/>
+          <a:ext cx="0" cy="0"/>
+          <a:chOff x="0" y="0"/>
+          <a:chExt cx="0" cy="0"/>
+        </a:xfrm>
+      </p:grpSpPr>
+      <p:sp>
+        <p:nvSpPr>
+          <p:cNvPr id="2" name="제목 1"/>
+          <p:cNvSpPr>
+            <a:spLocks noGrp="1"/>
+          </p:cNvSpPr>
+          <p:nvPr>
+            <p:ph type="title"/>
+          </p:nvPr>
+        </p:nvSpPr>
+        <p:spPr/>
+        <p:txBody>
+          <a:bodyPr/>
+          <a:lstStyle/>
+          <a:p>
+            <a:r>
+              <a:rPr kumimoji="1" lang="ko-KR" altLang="en-US" dirty="0" smtClean="0"/>
+              <a:t>목차</a:t>
+            </a:r>
+            <a:endParaRPr kumimoji="1" lang="ko-KR" altLang="en-US" dirty="0"/>
+          </a:p>
+        </p:txBody>
+      </p:sp>
+      <p:sp>
+        <p:nvSpPr>
+          <p:cNvPr id="3" name="내용 개체 틀 2"/>
+          <p:cNvSpPr>
+            <a:spLocks noGrp="1"/>
+          </p:cNvSpPr>
+          <p:nvPr>
+            <p:ph idx="1"/>
+          </p:nvPr>
+        </p:nvSpPr>
+        <p:spPr/>
+        <p:txBody>
+          <a:bodyPr/>
+          <a:lstStyle/>
+          <a:p>
+            <a:r>
+              <a:rPr kumimoji="1" lang="ko-KR" altLang="en-US" dirty="0" smtClean="0"/>
+              <a:t>개요</a:t>
+            </a:r>
+            <a:endParaRPr kumimoji="1" lang="en-US" altLang="ko-KR" dirty="0" smtClean="0"/>
+          </a:p>
+          <a:p>
+            <a:r>
+              <a:rPr kumimoji="1" lang="ko-KR" altLang="en-US" dirty="0" smtClean="0"/>
+              <a:t>기존 기술</a:t>
+            </a:r>
+            <a:endParaRPr kumimoji="1" lang="en-US" altLang="ko-KR" dirty="0" smtClean="0"/>
+          </a:p>
+          <a:p>
+            <a:r>
+              <a:rPr kumimoji="1" lang="ko-KR" altLang="en-US" dirty="0" smtClean="0"/>
+              <a:t>적용 기법 및 설계</a:t>
+            </a:r>
+            <a:endParaRPr kumimoji="1" lang="en-US" altLang="ko-KR" dirty="0" smtClean="0"/>
+          </a:p>
+          <a:p>
+            <a:pPr lvl="1"/>
+            <a:r>
+              <a:rPr kumimoji="1" lang="en-US" altLang="ko-KR" dirty="0" smtClean="0"/>
+              <a:t>Long-tail Threshold </a:t>
+            </a:r>
+            <a:r>
+              <a:rPr kumimoji="1" lang="ko-KR" altLang="en-US" dirty="0" smtClean="0"/>
+              <a:t>모델</a:t>
+            </a:r>
+            <a:endParaRPr kumimoji="1" lang="en-US" altLang="ko-KR" dirty="0" smtClean="0"/>
+          </a:p>
+          <a:p>
+            <a:pPr lvl="1"/>
+            <a:r>
+              <a:rPr kumimoji="1" lang="en-US" altLang="ko-KR" dirty="0" smtClean="0"/>
+              <a:t>Node Reducing</a:t>
+            </a:r>
+            <a:r>
+              <a:rPr kumimoji="1" lang="ko-KR" altLang="en-US" dirty="0" smtClean="0"/>
+              <a:t> 접근법</a:t>
+            </a:r>
+            <a:endParaRPr kumimoji="1" lang="en-US" altLang="ko-KR" dirty="0" smtClean="0"/>
+          </a:p>
+          <a:p>
+            <a:r>
+              <a:rPr kumimoji="1" lang="ko-KR" altLang="en-US" dirty="0" smtClean="0"/>
+              <a:t>실험 및 분석</a:t>
+            </a:r>
+            <a:endParaRPr kumimoji="1" lang="en-US" altLang="ko-KR" dirty="0" smtClean="0"/>
+          </a:p>
+          <a:p>
+            <a:r>
+              <a:rPr kumimoji="1" lang="ko-KR" altLang="en-US" dirty="0" smtClean="0"/>
+              <a:t>참고자료</a:t>
+            </a:r>
+            <a:endParaRPr kumimoji="1" lang="ko-KR" altLang="en-US" dirty="0"/>
+          </a:p>
+        </p:txBody>
+      </p:sp>
+    </p:spTree>
+    <p:extLst>
+      <p:ext uri="{BB962C8B-B14F-4D97-AF65-F5344CB8AC3E}">
+        <p14:creationId xmlns:p14="http://schemas.microsoft.com/office/powerpoint/2010/main" val="798641990"/>
+      </p:ext>
+    </p:extLst>
+  </p:cSld>
+  <p:clrMapOvr>
+    <a:masterClrMapping/>
+  </p:clrMapOvr>
+</p:sld>
+</file>
+
+<file path=ppt/slides/slide3.xml><?xml version="1.0" encoding="utf-8"?>
+<p:sld xmlns:a="http://schemas.openxmlformats.org/drawingml/2006/main" xmlns:r="http://schemas.openxmlformats.org/officeDocument/2006/relationships" xmlns:p="http://schemas.openxmlformats.org/presentationml/2006/main">
+  <p:cSld>
+    <p:spTree>
+      <p:nvGrpSpPr>
+        <p:cNvPr id="1" name=""/>
+        <p:cNvGrpSpPr/>
+        <p:nvPr/>
+      </p:nvGrpSpPr>
+      <p:grpSpPr>
+        <a:xfrm>
+          <a:off x="0" y="0"/>
+          <a:ext cx="0" cy="0"/>
+          <a:chOff x="0" y="0"/>
+          <a:chExt cx="0" cy="0"/>
+        </a:xfrm>
+      </p:grpSpPr>
+      <p:sp>
+        <p:nvSpPr>
+          <p:cNvPr id="2" name="제목 1"/>
+          <p:cNvSpPr>
+            <a:spLocks noGrp="1"/>
+          </p:cNvSpPr>
+          <p:nvPr>
+            <p:ph type="title"/>
+          </p:nvPr>
+        </p:nvSpPr>
+        <p:spPr/>
+        <p:txBody>
+          <a:bodyPr/>
+          <a:lstStyle/>
+          <a:p>
+            <a:r>
+              <a:rPr kumimoji="1" lang="ko-KR" altLang="en-US" dirty="0" smtClean="0"/>
+              <a:t>개요</a:t>
+            </a:r>
+            <a:endParaRPr kumimoji="1" lang="ko-KR" altLang="en-US" dirty="0"/>
+          </a:p>
+        </p:txBody>
+      </p:sp>
+      <p:sp>
+        <p:nvSpPr>
+          <p:cNvPr id="3" name="내용 개체 틀 2"/>
+          <p:cNvSpPr>
+            <a:spLocks noGrp="1"/>
+          </p:cNvSpPr>
+          <p:nvPr>
+            <p:ph idx="1"/>
+          </p:nvPr>
+        </p:nvSpPr>
+        <p:spPr/>
+        <p:txBody>
+          <a:bodyPr/>
+          <a:lstStyle/>
+          <a:p>
+            <a:r>
+              <a:rPr kumimoji="1" lang="ko-KR" altLang="en-US" dirty="0" smtClean="0"/>
+              <a:t>분산형 크롤러 방어를 목적으로 설계</a:t>
+            </a:r>
+            <a:endParaRPr kumimoji="1" lang="en-US" altLang="ko-KR" dirty="0" smtClean="0"/>
+          </a:p>
+          <a:p>
+            <a:pPr lvl="1"/>
+            <a:r>
+              <a:rPr kumimoji="1" lang="ko-KR" altLang="en-US" dirty="0" smtClean="0"/>
+              <a:t>기존의 방어 기법으로는 방어 난해</a:t>
+            </a:r>
+            <a:endParaRPr kumimoji="1" lang="en-US" altLang="ko-KR" dirty="0" smtClean="0"/>
+          </a:p>
+          <a:p>
+            <a:endParaRPr kumimoji="1" lang="en-US" altLang="ko-KR" dirty="0"/>
+          </a:p>
+          <a:p>
+            <a:r>
+              <a:rPr kumimoji="1" lang="ko-KR" altLang="en-US" dirty="0" smtClean="0"/>
+              <a:t>핵심 아이디어</a:t>
+            </a:r>
+            <a:r>
+              <a:rPr kumimoji="1" lang="en-US" altLang="ko-KR" dirty="0" smtClean="0"/>
+              <a:t>:</a:t>
+            </a:r>
+          </a:p>
+          <a:p>
+            <a:pPr lvl="1"/>
+            <a:r>
+              <a:rPr kumimoji="1" lang="ko-KR" altLang="en-US" dirty="0" smtClean="0"/>
+              <a:t>발생 확률이 낮은 사건 지속 발생 시</a:t>
+            </a:r>
+            <a:r>
+              <a:rPr kumimoji="1" lang="en-US" altLang="ko-KR" dirty="0" smtClean="0"/>
+              <a:t>,</a:t>
+            </a:r>
+            <a:r>
+              <a:rPr kumimoji="1" lang="ko-KR" altLang="en-US" dirty="0" smtClean="0"/>
+              <a:t> 해당 주체 의심</a:t>
+            </a:r>
+            <a:endParaRPr kumimoji="1" lang="en-US" altLang="ko-KR" dirty="0" smtClean="0"/>
+          </a:p>
+          <a:p>
+            <a:pPr lvl="1"/>
+            <a:r>
+              <a:rPr kumimoji="1" lang="ko-KR" altLang="en-US" dirty="0" smtClean="0"/>
+              <a:t>웹트래픽을 분석하여 확률이 낮은 사건의 집합</a:t>
+            </a:r>
+            <a:r>
+              <a:rPr kumimoji="1" lang="en-US" altLang="ko-KR" dirty="0" smtClean="0"/>
+              <a:t>(long-tail)</a:t>
+            </a:r>
+            <a:r>
+              <a:rPr kumimoji="1" lang="ko-KR" altLang="en-US" dirty="0" smtClean="0"/>
+              <a:t>을 정의</a:t>
+            </a:r>
+            <a:endParaRPr kumimoji="1" lang="ko-KR" altLang="en-US" dirty="0"/>
+          </a:p>
+        </p:txBody>
+      </p:sp>
+    </p:spTree>
+    <p:extLst>
+      <p:ext uri="{BB962C8B-B14F-4D97-AF65-F5344CB8AC3E}">
+        <p14:creationId xmlns:p14="http://schemas.microsoft.com/office/powerpoint/2010/main" val="1712282169"/>
+      </p:ext>
+    </p:extLst>
+  </p:cSld>
+  <p:clrMapOvr>
+    <a:masterClrMapping/>
+  </p:clrMapOvr>
+</p:sld>
+</file>
+
+<file path=ppt/slides/slide4.xml><?xml version="1.0" encoding="utf-8"?>
+<p:sld xmlns:a="http://schemas.openxmlformats.org/drawingml/2006/main" xmlns:r="http://schemas.openxmlformats.org/officeDocument/2006/relationships" xmlns:p="http://schemas.openxmlformats.org/presentationml/2006/main">
+  <p:cSld>
+    <p:spTree>
+      <p:nvGrpSpPr>
+        <p:cNvPr id="1" name=""/>
+        <p:cNvGrpSpPr/>
+        <p:nvPr/>
+      </p:nvGrpSpPr>
+      <p:grpSpPr>
+        <a:xfrm>
+          <a:off x="0" y="0"/>
+          <a:ext cx="0" cy="0"/>
+          <a:chOff x="0" y="0"/>
+          <a:chExt cx="0" cy="0"/>
+        </a:xfrm>
+      </p:grpSpPr>
+      <p:sp>
+        <p:nvSpPr>
+          <p:cNvPr id="2" name="제목 1"/>
+          <p:cNvSpPr>
+            <a:spLocks noGrp="1"/>
+          </p:cNvSpPr>
+          <p:nvPr>
+            <p:ph type="title"/>
+          </p:nvPr>
+        </p:nvSpPr>
+        <p:spPr/>
+        <p:txBody>
+          <a:bodyPr/>
+          <a:lstStyle/>
+          <a:p>
+            <a:r>
+              <a:rPr kumimoji="1" lang="ko-KR" altLang="en-US" dirty="0" smtClean="0"/>
+              <a:t>기존 기술</a:t>
+            </a:r>
+            <a:endParaRPr kumimoji="1" lang="ko-KR" altLang="en-US" dirty="0"/>
+          </a:p>
+        </p:txBody>
+      </p:sp>
+      <p:sp>
+        <p:nvSpPr>
+          <p:cNvPr id="3" name="내용 개체 틀 2"/>
+          <p:cNvSpPr>
+            <a:spLocks noGrp="1"/>
+          </p:cNvSpPr>
+          <p:nvPr>
+            <p:ph idx="1"/>
+          </p:nvPr>
+        </p:nvSpPr>
+        <p:spPr/>
+        <p:txBody>
+          <a:bodyPr>
+            <a:normAutofit lnSpcReduction="10000"/>
+          </a:bodyPr>
+          <a:lstStyle/>
+          <a:p>
+            <a:r>
+              <a:rPr kumimoji="1" lang="en-US" altLang="ko-KR" dirty="0" smtClean="0"/>
+              <a:t>HTTP </a:t>
+            </a:r>
+            <a:r>
+              <a:rPr kumimoji="1" lang="ko-KR" altLang="en-US" dirty="0" smtClean="0"/>
+              <a:t>헤더 확인</a:t>
+            </a:r>
+            <a:endParaRPr kumimoji="1" lang="en-US" altLang="ko-KR" dirty="0" smtClean="0"/>
+          </a:p>
+          <a:p>
+            <a:pPr lvl="1"/>
+            <a:r>
+              <a:rPr kumimoji="1" lang="ko-KR" altLang="en-US" dirty="0" smtClean="0"/>
+              <a:t>낮은 수준의 </a:t>
+            </a:r>
+            <a:r>
+              <a:rPr kumimoji="1" lang="en-US" altLang="ko-KR" dirty="0" smtClean="0"/>
+              <a:t>web crawler</a:t>
+            </a:r>
+            <a:r>
+              <a:rPr kumimoji="1" lang="ko-KR" altLang="en-US" dirty="0" smtClean="0"/>
+              <a:t>는 헤더변조를 하지 않음</a:t>
+            </a:r>
+            <a:endParaRPr kumimoji="1" lang="en-US" altLang="ko-KR" dirty="0" smtClean="0"/>
+          </a:p>
+          <a:p>
+            <a:endParaRPr kumimoji="1" lang="en-US" altLang="ko-KR" dirty="0"/>
+          </a:p>
+          <a:p>
+            <a:r>
+              <a:rPr kumimoji="1" lang="ko-KR" altLang="en-US" dirty="0" smtClean="0"/>
+              <a:t>접근 패턴 확인</a:t>
+            </a:r>
+            <a:endParaRPr kumimoji="1" lang="en-US" altLang="ko-KR" dirty="0" smtClean="0"/>
+          </a:p>
+          <a:p>
+            <a:pPr lvl="1"/>
+            <a:r>
+              <a:rPr kumimoji="1" lang="ko-KR" altLang="en-US" dirty="0" smtClean="0"/>
+              <a:t>일부 </a:t>
+            </a:r>
+            <a:r>
+              <a:rPr kumimoji="1" lang="en-US" altLang="ko-KR" dirty="0"/>
+              <a:t>w</a:t>
+            </a:r>
+            <a:r>
+              <a:rPr kumimoji="1" lang="en-US" altLang="ko-KR" dirty="0" smtClean="0"/>
+              <a:t>eb crawler</a:t>
+            </a:r>
+            <a:r>
+              <a:rPr kumimoji="1" lang="ko-KR" altLang="en-US" dirty="0" smtClean="0"/>
+              <a:t>는 속도 및 처리를 위해 필요한 자원에만 접근</a:t>
+            </a:r>
+            <a:endParaRPr kumimoji="1" lang="en-US" altLang="ko-KR" dirty="0" smtClean="0"/>
+          </a:p>
+          <a:p>
+            <a:pPr lvl="1"/>
+            <a:r>
+              <a:rPr kumimoji="1" lang="ko-KR" altLang="en-US" dirty="0" smtClean="0"/>
+              <a:t>일반 사용자와 접근 패턴 상이</a:t>
+            </a:r>
+            <a:endParaRPr kumimoji="1" lang="en-US" altLang="ko-KR" dirty="0" smtClean="0"/>
+          </a:p>
+          <a:p>
+            <a:endParaRPr kumimoji="1" lang="en-US" altLang="ko-KR" dirty="0"/>
+          </a:p>
+          <a:p>
+            <a:r>
+              <a:rPr kumimoji="1" lang="ko-KR" altLang="en-US" dirty="0" smtClean="0"/>
+              <a:t>접근 빈도 확인</a:t>
+            </a:r>
+            <a:endParaRPr kumimoji="1" lang="en-US" altLang="ko-KR" dirty="0" smtClean="0"/>
+          </a:p>
+          <a:p>
+            <a:pPr lvl="1"/>
+            <a:r>
+              <a:rPr kumimoji="1" lang="ko-KR" altLang="en-US" dirty="0" smtClean="0"/>
+              <a:t>수집 대상이 많을 경우</a:t>
+            </a:r>
+            <a:r>
+              <a:rPr kumimoji="1" lang="en-US" altLang="ko-KR" dirty="0" smtClean="0"/>
+              <a:t>,</a:t>
+            </a:r>
+            <a:r>
+              <a:rPr kumimoji="1" lang="ko-KR" altLang="en-US" dirty="0" smtClean="0"/>
+              <a:t> </a:t>
+            </a:r>
+            <a:r>
+              <a:rPr kumimoji="1" lang="en-US" altLang="ko-KR" dirty="0" smtClean="0"/>
+              <a:t>web crawler</a:t>
+            </a:r>
+            <a:r>
+              <a:rPr kumimoji="1" lang="ko-KR" altLang="en-US" dirty="0" smtClean="0"/>
+              <a:t>는 한정 시간 내에 수집하기 위해 대량의 </a:t>
+            </a:r>
+            <a:r>
+              <a:rPr kumimoji="1" lang="en-US" altLang="ko-KR" dirty="0" smtClean="0"/>
+              <a:t>request</a:t>
+            </a:r>
+            <a:r>
+              <a:rPr kumimoji="1" lang="ko-KR" altLang="en-US" dirty="0"/>
+              <a:t> </a:t>
+            </a:r>
+            <a:r>
+              <a:rPr kumimoji="1" lang="ko-KR" altLang="en-US" dirty="0" smtClean="0"/>
+              <a:t>요청</a:t>
+            </a:r>
+            <a:endParaRPr kumimoji="1" lang="ko-KR" altLang="en-US" dirty="0"/>
+          </a:p>
+        </p:txBody>
+      </p:sp>
+    </p:spTree>
+    <p:extLst>
+      <p:ext uri="{BB962C8B-B14F-4D97-AF65-F5344CB8AC3E}">
+        <p14:creationId xmlns:p14="http://schemas.microsoft.com/office/powerpoint/2010/main" val="440485333"/>
+      </p:ext>
+    </p:extLst>
+  </p:cSld>
+  <p:clrMapOvr>
+    <a:masterClrMapping/>
+  </p:clrMapOvr>
+</p:sld>
+</file>
+
+<file path=ppt/slides/slide5.xml><?xml version="1.0" encoding="utf-8"?>
+<p:sld xmlns:a="http://schemas.openxmlformats.org/drawingml/2006/main" xmlns:r="http://schemas.openxmlformats.org/officeDocument/2006/relationships" xmlns:p="http://schemas.openxmlformats.org/presentationml/2006/main">
+  <p:cSld>
+    <p:spTree>
+      <p:nvGrpSpPr>
+        <p:cNvPr id="1" name=""/>
+        <p:cNvGrpSpPr/>
+        <p:nvPr/>
+      </p:nvGrpSpPr>
+      <p:grpSpPr>
+        <a:xfrm>
+          <a:off x="0" y="0"/>
+          <a:ext cx="0" cy="0"/>
+          <a:chOff x="0" y="0"/>
+          <a:chExt cx="0" cy="0"/>
+        </a:xfrm>
+      </p:grpSpPr>
+      <p:sp>
+        <p:nvSpPr>
+          <p:cNvPr id="2" name="제목 1"/>
+          <p:cNvSpPr>
+            <a:spLocks noGrp="1"/>
+          </p:cNvSpPr>
+          <p:nvPr>
+            <p:ph type="title"/>
+          </p:nvPr>
+        </p:nvSpPr>
+        <p:spPr/>
+        <p:txBody>
+          <a:bodyPr/>
+          <a:lstStyle/>
+          <a:p>
+            <a:r>
+              <a:rPr kumimoji="1" lang="ko-KR" altLang="en-US" dirty="0" smtClean="0"/>
+              <a:t>적용기법 및 설계</a:t>
+            </a:r>
+            <a:endParaRPr kumimoji="1" lang="ko-KR" altLang="en-US" dirty="0"/>
+          </a:p>
+        </p:txBody>
+      </p:sp>
+      <p:sp>
+        <p:nvSpPr>
+          <p:cNvPr id="3" name="내용 개체 틀 2"/>
+          <p:cNvSpPr>
+            <a:spLocks noGrp="1"/>
+          </p:cNvSpPr>
+          <p:nvPr>
+            <p:ph idx="1"/>
+          </p:nvPr>
+        </p:nvSpPr>
+        <p:spPr/>
+        <p:txBody>
+          <a:bodyPr/>
+          <a:lstStyle/>
+          <a:p>
+            <a:endParaRPr kumimoji="1" lang="ko-KR" altLang="en-US"/>
+          </a:p>
+        </p:txBody>
+      </p:sp>
+    </p:spTree>
+    <p:extLst>
+      <p:ext uri="{BB962C8B-B14F-4D97-AF65-F5344CB8AC3E}">
+        <p14:creationId xmlns:p14="http://schemas.microsoft.com/office/powerpoint/2010/main" val="1137419272"/>
+      </p:ext>
+    </p:extLst>
+  </p:cSld>
+  <p:clrMapOvr>
+    <a:masterClrMapping/>
+  </p:clrMapOvr>
+</p:sld>
+</file>
+
+<file path=ppt/slides/slide6.xml><?xml version="1.0" encoding="utf-8"?>
+<p:sld xmlns:a="http://schemas.openxmlformats.org/drawingml/2006/main" xmlns:r="http://schemas.openxmlformats.org/officeDocument/2006/relationships" xmlns:p="http://schemas.openxmlformats.org/presentationml/2006/main">
+  <p:cSld>
+    <p:spTree>
+      <p:nvGrpSpPr>
+        <p:cNvPr id="1" name=""/>
+        <p:cNvGrpSpPr/>
+        <p:nvPr/>
+      </p:nvGrpSpPr>
+      <p:grpSpPr>
+        <a:xfrm>
+          <a:off x="0" y="0"/>
+          <a:ext cx="0" cy="0"/>
+          <a:chOff x="0" y="0"/>
+          <a:chExt cx="0" cy="0"/>
+        </a:xfrm>
+      </p:grpSpPr>
+      <p:sp>
+        <p:nvSpPr>
+          <p:cNvPr id="2" name="제목 1"/>
+          <p:cNvSpPr>
+            <a:spLocks noGrp="1"/>
+          </p:cNvSpPr>
+          <p:nvPr>
+            <p:ph type="title"/>
+          </p:nvPr>
+        </p:nvSpPr>
+        <p:spPr/>
+        <p:txBody>
+          <a:bodyPr/>
+          <a:lstStyle/>
+          <a:p>
+            <a:r>
+              <a:rPr kumimoji="1" lang="ko-KR" altLang="en-US" dirty="0" smtClean="0"/>
+              <a:t>실험 및 분석</a:t>
+            </a:r>
+            <a:endParaRPr kumimoji="1" lang="ko-KR" altLang="en-US" dirty="0"/>
+          </a:p>
+        </p:txBody>
+      </p:sp>
+      <p:sp>
+        <p:nvSpPr>
+          <p:cNvPr id="3" name="내용 개체 틀 2"/>
+          <p:cNvSpPr>
+            <a:spLocks noGrp="1"/>
+          </p:cNvSpPr>
+          <p:nvPr>
+            <p:ph idx="1"/>
+          </p:nvPr>
+        </p:nvSpPr>
+        <p:spPr/>
+        <p:txBody>
+          <a:bodyPr/>
+          <a:lstStyle/>
+          <a:p>
+            <a:endParaRPr kumimoji="1" lang="ko-KR" altLang="en-US"/>
+          </a:p>
+        </p:txBody>
+      </p:sp>
+    </p:spTree>
+    <p:extLst>
+      <p:ext uri="{BB962C8B-B14F-4D97-AF65-F5344CB8AC3E}">
+        <p14:creationId xmlns:p14="http://schemas.microsoft.com/office/powerpoint/2010/main" val="146330012"/>
+      </p:ext>
+    </p:extLst>
+  </p:cSld>
+  <p:clrMapOvr>
+    <a:masterClrMapping/>
+  </p:clrMapOvr>
+</p:sld>
+</file>
+
+<file path=ppt/slides/slide7.xml><?xml version="1.0" encoding="utf-8"?>
+<p:sld xmlns:a="http://schemas.openxmlformats.org/drawingml/2006/main" xmlns:r="http://schemas.openxmlformats.org/officeDocument/2006/relationships" xmlns:p="http://schemas.openxmlformats.org/presentationml/2006/main">
+  <p:cSld>
+    <p:spTree>
+      <p:nvGrpSpPr>
+        <p:cNvPr id="1" name=""/>
+        <p:cNvGrpSpPr/>
+        <p:nvPr/>
+      </p:nvGrpSpPr>
+      <p:grpSpPr>
+        <a:xfrm>
+          <a:off x="0" y="0"/>
+          <a:ext cx="0" cy="0"/>
+          <a:chOff x="0" y="0"/>
+          <a:chExt cx="0" cy="0"/>
+        </a:xfrm>
+      </p:grpSpPr>
+      <p:sp>
+        <p:nvSpPr>
+          <p:cNvPr id="2" name="제목 1"/>
+          <p:cNvSpPr>
+            <a:spLocks noGrp="1"/>
+          </p:cNvSpPr>
+          <p:nvPr>
+            <p:ph type="title"/>
+          </p:nvPr>
+        </p:nvSpPr>
+        <p:spPr/>
+        <p:txBody>
+          <a:bodyPr/>
+          <a:lstStyle/>
+          <a:p>
+            <a:r>
+              <a:rPr kumimoji="1" lang="ko-KR" altLang="en-US" dirty="0" smtClean="0"/>
+              <a:t>참고자료</a:t>
+            </a:r>
+            <a:endParaRPr kumimoji="1" lang="ko-KR" altLang="en-US" dirty="0"/>
+          </a:p>
+        </p:txBody>
+      </p:sp>
+      <p:sp>
+        <p:nvSpPr>
+          <p:cNvPr id="3" name="내용 개체 틀 2"/>
+          <p:cNvSpPr>
+            <a:spLocks noGrp="1"/>
+          </p:cNvSpPr>
+          <p:nvPr>
+            <p:ph idx="1"/>
+          </p:nvPr>
+        </p:nvSpPr>
+        <p:spPr/>
+        <p:txBody>
+          <a:bodyPr/>
+          <a:lstStyle/>
+          <a:p>
+            <a:endParaRPr kumimoji="1" lang="en-US" altLang="ko-KR" dirty="0" smtClean="0"/>
+          </a:p>
+          <a:p>
+            <a:r>
+              <a:rPr lang="en-US" altLang="ko-KR" dirty="0"/>
+              <a:t>Athena </a:t>
+            </a:r>
+            <a:r>
+              <a:rPr lang="en-US" altLang="ko-KR" dirty="0" err="1"/>
+              <a:t>Stassopoulou</a:t>
+            </a:r>
+            <a:r>
+              <a:rPr lang="en-US" altLang="ko-KR" dirty="0"/>
+              <a:t> and </a:t>
+            </a:r>
+            <a:r>
+              <a:rPr lang="en-US" altLang="ko-KR" dirty="0" err="1"/>
+              <a:t>Marios</a:t>
+            </a:r>
+            <a:r>
+              <a:rPr lang="en-US" altLang="ko-KR" dirty="0"/>
+              <a:t> D </a:t>
+            </a:r>
+            <a:r>
+              <a:rPr lang="en-US" altLang="ko-KR" dirty="0" err="1"/>
+              <a:t>Dikaiakos</a:t>
+            </a:r>
+            <a:r>
+              <a:rPr lang="en-US" altLang="ko-KR" dirty="0"/>
+              <a:t>. 2006. </a:t>
+            </a:r>
+            <a:r>
+              <a:rPr lang="en-US" altLang="ko-KR" b="1" dirty="0"/>
+              <a:t>Crawler detection: </a:t>
+            </a:r>
+            <a:r>
+              <a:rPr lang="en-US" altLang="ko-KR" b="1" dirty="0" smtClean="0"/>
+              <a:t>A</a:t>
+            </a:r>
+            <a:r>
+              <a:rPr lang="ko-KR" altLang="en-US" b="1" dirty="0" smtClean="0"/>
+              <a:t> </a:t>
+            </a:r>
+            <a:r>
+              <a:rPr lang="en-US" altLang="ko-KR" b="1" dirty="0" err="1" smtClean="0"/>
+              <a:t>bayesian</a:t>
+            </a:r>
+            <a:r>
+              <a:rPr lang="en-US" altLang="ko-KR" b="1" dirty="0" smtClean="0"/>
+              <a:t> </a:t>
+            </a:r>
+            <a:r>
+              <a:rPr lang="en-US" altLang="ko-KR" b="1" dirty="0"/>
+              <a:t>approach. </a:t>
+            </a:r>
+            <a:r>
+              <a:rPr lang="en-US" altLang="ko-KR" dirty="0"/>
+              <a:t>In Internet Surveillance and Protection, 2006. ICISP’06. </a:t>
+            </a:r>
+            <a:r>
+              <a:rPr lang="en-US" altLang="ko-KR" dirty="0" smtClean="0"/>
+              <a:t>International</a:t>
+            </a:r>
+            <a:r>
+              <a:rPr lang="ko-KR" altLang="en-US" dirty="0" smtClean="0"/>
+              <a:t> </a:t>
+            </a:r>
+            <a:r>
+              <a:rPr lang="en-US" altLang="ko-KR" dirty="0" smtClean="0"/>
+              <a:t>Conference </a:t>
+            </a:r>
+            <a:r>
+              <a:rPr lang="en-US" altLang="ko-KR" dirty="0"/>
+              <a:t>on. IEEE, 16–16.</a:t>
+            </a:r>
+            <a:endParaRPr kumimoji="1" lang="ko-KR" altLang="en-US" dirty="0"/>
+          </a:p>
+        </p:txBody>
+      </p:sp>
+    </p:spTree>
+    <p:extLst>
+      <p:ext uri="{BB962C8B-B14F-4D97-AF65-F5344CB8AC3E}">
+        <p14:creationId xmlns:p14="http://schemas.microsoft.com/office/powerpoint/2010/main" val="495310925"/>
       </p:ext>
     </p:extLst>
   </p:cSld>

</xml_diff>

<commit_message>
Merged professor's version with new figures
</commit_message>
<xml_diff>
--- a/30_Presentation/AntiCrawlerLTM_노인우_20180611.pptx
+++ b/30_Presentation/AntiCrawlerLTM_노인우_20180611.pptx
@@ -4,14 +4,20 @@
   <p:sldMasterIdLst>
     <p:sldMasterId id="2147483648" r:id="rId1"/>
   </p:sldMasterIdLst>
+  <p:notesMasterIdLst>
+    <p:notesMasterId r:id="rId12"/>
+  </p:notesMasterIdLst>
   <p:sldIdLst>
     <p:sldId id="256" r:id="rId2"/>
     <p:sldId id="257" r:id="rId3"/>
     <p:sldId id="258" r:id="rId4"/>
     <p:sldId id="259" r:id="rId5"/>
     <p:sldId id="260" r:id="rId6"/>
-    <p:sldId id="261" r:id="rId7"/>
-    <p:sldId id="262" r:id="rId8"/>
+    <p:sldId id="263" r:id="rId7"/>
+    <p:sldId id="261" r:id="rId8"/>
+    <p:sldId id="264" r:id="rId9"/>
+    <p:sldId id="265" r:id="rId10"/>
+    <p:sldId id="262" r:id="rId11"/>
   </p:sldIdLst>
   <p:sldSz cx="12192000" cy="6858000"/>
   <p:notesSz cx="6858000" cy="9144000"/>
@@ -113,6 +119,440 @@
 </p:presentation>
 </file>
 
+<file path=ppt/notesMasters/notesMaster1.xml><?xml version="1.0" encoding="utf-8"?>
+<p:notesMaster xmlns:a="http://schemas.openxmlformats.org/drawingml/2006/main" xmlns:r="http://schemas.openxmlformats.org/officeDocument/2006/relationships" xmlns:p="http://schemas.openxmlformats.org/presentationml/2006/main">
+  <p:cSld>
+    <p:bg>
+      <p:bgRef idx="1001">
+        <a:schemeClr val="bg1"/>
+      </p:bgRef>
+    </p:bg>
+    <p:spTree>
+      <p:nvGrpSpPr>
+        <p:cNvPr id="1" name=""/>
+        <p:cNvGrpSpPr/>
+        <p:nvPr/>
+      </p:nvGrpSpPr>
+      <p:grpSpPr>
+        <a:xfrm>
+          <a:off x="0" y="0"/>
+          <a:ext cx="0" cy="0"/>
+          <a:chOff x="0" y="0"/>
+          <a:chExt cx="0" cy="0"/>
+        </a:xfrm>
+      </p:grpSpPr>
+      <p:sp>
+        <p:nvSpPr>
+          <p:cNvPr id="2" name="머리글 개체 틀 1"/>
+          <p:cNvSpPr>
+            <a:spLocks noGrp="1"/>
+          </p:cNvSpPr>
+          <p:nvPr>
+            <p:ph type="hdr" sz="quarter"/>
+          </p:nvPr>
+        </p:nvSpPr>
+        <p:spPr>
+          <a:xfrm>
+            <a:off x="0" y="0"/>
+            <a:ext cx="2971800" cy="458788"/>
+          </a:xfrm>
+          <a:prstGeom prst="rect">
+            <a:avLst/>
+          </a:prstGeom>
+        </p:spPr>
+        <p:txBody>
+          <a:bodyPr vert="horz" lIns="91440" tIns="45720" rIns="91440" bIns="45720" rtlCol="0"/>
+          <a:lstStyle>
+            <a:lvl1pPr algn="l">
+              <a:defRPr sz="1200"/>
+            </a:lvl1pPr>
+          </a:lstStyle>
+          <a:p>
+            <a:endParaRPr kumimoji="1" lang="ko-KR" altLang="en-US"/>
+          </a:p>
+        </p:txBody>
+      </p:sp>
+      <p:sp>
+        <p:nvSpPr>
+          <p:cNvPr id="3" name="날짜 개체 틀 2"/>
+          <p:cNvSpPr>
+            <a:spLocks noGrp="1"/>
+          </p:cNvSpPr>
+          <p:nvPr>
+            <p:ph type="dt" idx="1"/>
+          </p:nvPr>
+        </p:nvSpPr>
+        <p:spPr>
+          <a:xfrm>
+            <a:off x="3884613" y="0"/>
+            <a:ext cx="2971800" cy="458788"/>
+          </a:xfrm>
+          <a:prstGeom prst="rect">
+            <a:avLst/>
+          </a:prstGeom>
+        </p:spPr>
+        <p:txBody>
+          <a:bodyPr vert="horz" lIns="91440" tIns="45720" rIns="91440" bIns="45720" rtlCol="0"/>
+          <a:lstStyle>
+            <a:lvl1pPr algn="r">
+              <a:defRPr sz="1200"/>
+            </a:lvl1pPr>
+          </a:lstStyle>
+          <a:p>
+            <a:fld id="{25362424-2B4C-6343-B6FD-6859BE7BBBBF}" type="datetimeFigureOut">
+              <a:rPr kumimoji="1" lang="ko-KR" altLang="en-US" smtClean="0"/>
+              <a:t>2018. 6. 12.</a:t>
+            </a:fld>
+            <a:endParaRPr kumimoji="1" lang="ko-KR" altLang="en-US"/>
+          </a:p>
+        </p:txBody>
+      </p:sp>
+      <p:sp>
+        <p:nvSpPr>
+          <p:cNvPr id="4" name="슬라이드 이미지 개체 틀 3"/>
+          <p:cNvSpPr>
+            <a:spLocks noGrp="1" noRot="1" noChangeAspect="1"/>
+          </p:cNvSpPr>
+          <p:nvPr>
+            <p:ph type="sldImg" idx="2"/>
+          </p:nvPr>
+        </p:nvSpPr>
+        <p:spPr>
+          <a:xfrm>
+            <a:off x="685800" y="1143000"/>
+            <a:ext cx="5486400" cy="3086100"/>
+          </a:xfrm>
+          <a:prstGeom prst="rect">
+            <a:avLst/>
+          </a:prstGeom>
+          <a:noFill/>
+          <a:ln w="12700">
+            <a:solidFill>
+              <a:prstClr val="black"/>
+            </a:solidFill>
+          </a:ln>
+        </p:spPr>
+        <p:txBody>
+          <a:bodyPr vert="horz" lIns="91440" tIns="45720" rIns="91440" bIns="45720" rtlCol="0" anchor="ctr"/>
+          <a:lstStyle/>
+          <a:p>
+            <a:endParaRPr lang="ko-KR" altLang="en-US"/>
+          </a:p>
+        </p:txBody>
+      </p:sp>
+      <p:sp>
+        <p:nvSpPr>
+          <p:cNvPr id="5" name="슬라이드 노트 개체 틀 4"/>
+          <p:cNvSpPr>
+            <a:spLocks noGrp="1"/>
+          </p:cNvSpPr>
+          <p:nvPr>
+            <p:ph type="body" sz="quarter" idx="3"/>
+          </p:nvPr>
+        </p:nvSpPr>
+        <p:spPr>
+          <a:xfrm>
+            <a:off x="685800" y="4400550"/>
+            <a:ext cx="5486400" cy="3600450"/>
+          </a:xfrm>
+          <a:prstGeom prst="rect">
+            <a:avLst/>
+          </a:prstGeom>
+        </p:spPr>
+        <p:txBody>
+          <a:bodyPr vert="horz" lIns="91440" tIns="45720" rIns="91440" bIns="45720" rtlCol="0"/>
+          <a:lstStyle/>
+          <a:p>
+            <a:pPr lvl="0"/>
+            <a:r>
+              <a:rPr kumimoji="1" lang="ko-KR" altLang="en-US" smtClean="0"/>
+              <a:t>마스터 텍스트 스타일을 편집하려면 클릭</a:t>
+            </a:r>
+          </a:p>
+          <a:p>
+            <a:pPr lvl="1"/>
+            <a:r>
+              <a:rPr kumimoji="1" lang="ko-KR" altLang="en-US" smtClean="0"/>
+              <a:t>두 번째 수준</a:t>
+            </a:r>
+          </a:p>
+          <a:p>
+            <a:pPr lvl="2"/>
+            <a:r>
+              <a:rPr kumimoji="1" lang="ko-KR" altLang="en-US" smtClean="0"/>
+              <a:t>세 번째 수준</a:t>
+            </a:r>
+          </a:p>
+          <a:p>
+            <a:pPr lvl="3"/>
+            <a:r>
+              <a:rPr kumimoji="1" lang="ko-KR" altLang="en-US" smtClean="0"/>
+              <a:t>네 번째 수준</a:t>
+            </a:r>
+          </a:p>
+          <a:p>
+            <a:pPr lvl="4"/>
+            <a:r>
+              <a:rPr kumimoji="1" lang="ko-KR" altLang="en-US" smtClean="0"/>
+              <a:t>다섯 번째 수준</a:t>
+            </a:r>
+            <a:endParaRPr kumimoji="1" lang="ko-KR" altLang="en-US"/>
+          </a:p>
+        </p:txBody>
+      </p:sp>
+      <p:sp>
+        <p:nvSpPr>
+          <p:cNvPr id="6" name="바닥글 개체 틀 5"/>
+          <p:cNvSpPr>
+            <a:spLocks noGrp="1"/>
+          </p:cNvSpPr>
+          <p:nvPr>
+            <p:ph type="ftr" sz="quarter" idx="4"/>
+          </p:nvPr>
+        </p:nvSpPr>
+        <p:spPr>
+          <a:xfrm>
+            <a:off x="0" y="8685213"/>
+            <a:ext cx="2971800" cy="458787"/>
+          </a:xfrm>
+          <a:prstGeom prst="rect">
+            <a:avLst/>
+          </a:prstGeom>
+        </p:spPr>
+        <p:txBody>
+          <a:bodyPr vert="horz" lIns="91440" tIns="45720" rIns="91440" bIns="45720" rtlCol="0" anchor="b"/>
+          <a:lstStyle>
+            <a:lvl1pPr algn="l">
+              <a:defRPr sz="1200"/>
+            </a:lvl1pPr>
+          </a:lstStyle>
+          <a:p>
+            <a:endParaRPr kumimoji="1" lang="ko-KR" altLang="en-US"/>
+          </a:p>
+        </p:txBody>
+      </p:sp>
+      <p:sp>
+        <p:nvSpPr>
+          <p:cNvPr id="7" name="슬라이드 번호 개체 틀 6"/>
+          <p:cNvSpPr>
+            <a:spLocks noGrp="1"/>
+          </p:cNvSpPr>
+          <p:nvPr>
+            <p:ph type="sldNum" sz="quarter" idx="5"/>
+          </p:nvPr>
+        </p:nvSpPr>
+        <p:spPr>
+          <a:xfrm>
+            <a:off x="3884613" y="8685213"/>
+            <a:ext cx="2971800" cy="458787"/>
+          </a:xfrm>
+          <a:prstGeom prst="rect">
+            <a:avLst/>
+          </a:prstGeom>
+        </p:spPr>
+        <p:txBody>
+          <a:bodyPr vert="horz" lIns="91440" tIns="45720" rIns="91440" bIns="45720" rtlCol="0" anchor="b"/>
+          <a:lstStyle>
+            <a:lvl1pPr algn="r">
+              <a:defRPr sz="1200"/>
+            </a:lvl1pPr>
+          </a:lstStyle>
+          <a:p>
+            <a:fld id="{B1DF0936-DD82-9B46-BEB4-C3050B2A9764}" type="slidenum">
+              <a:rPr kumimoji="1" lang="ko-KR" altLang="en-US" smtClean="0"/>
+              <a:t>‹#›</a:t>
+            </a:fld>
+            <a:endParaRPr kumimoji="1" lang="ko-KR" altLang="en-US"/>
+          </a:p>
+        </p:txBody>
+      </p:sp>
+    </p:spTree>
+    <p:extLst>
+      <p:ext uri="{BB962C8B-B14F-4D97-AF65-F5344CB8AC3E}">
+        <p14:creationId xmlns:p14="http://schemas.microsoft.com/office/powerpoint/2010/main" val="271316297"/>
+      </p:ext>
+    </p:extLst>
+  </p:cSld>
+  <p:clrMap bg1="lt1" tx1="dk1" bg2="lt2" tx2="dk2" accent1="accent1" accent2="accent2" accent3="accent3" accent4="accent4" accent5="accent5" accent6="accent6" hlink="hlink" folHlink="folHlink"/>
+  <p:notesStyle>
+    <a:lvl1pPr marL="0" algn="l" defTabSz="914400" rtl="0" eaLnBrk="1" latinLnBrk="1" hangingPunct="1">
+      <a:defRPr sz="1200" kern="1200">
+        <a:solidFill>
+          <a:schemeClr val="tx1"/>
+        </a:solidFill>
+        <a:latin typeface="+mn-lt"/>
+        <a:ea typeface="+mn-ea"/>
+        <a:cs typeface="+mn-cs"/>
+      </a:defRPr>
+    </a:lvl1pPr>
+    <a:lvl2pPr marL="457200" algn="l" defTabSz="914400" rtl="0" eaLnBrk="1" latinLnBrk="1" hangingPunct="1">
+      <a:defRPr sz="1200" kern="1200">
+        <a:solidFill>
+          <a:schemeClr val="tx1"/>
+        </a:solidFill>
+        <a:latin typeface="+mn-lt"/>
+        <a:ea typeface="+mn-ea"/>
+        <a:cs typeface="+mn-cs"/>
+      </a:defRPr>
+    </a:lvl2pPr>
+    <a:lvl3pPr marL="914400" algn="l" defTabSz="914400" rtl="0" eaLnBrk="1" latinLnBrk="1" hangingPunct="1">
+      <a:defRPr sz="1200" kern="1200">
+        <a:solidFill>
+          <a:schemeClr val="tx1"/>
+        </a:solidFill>
+        <a:latin typeface="+mn-lt"/>
+        <a:ea typeface="+mn-ea"/>
+        <a:cs typeface="+mn-cs"/>
+      </a:defRPr>
+    </a:lvl3pPr>
+    <a:lvl4pPr marL="1371600" algn="l" defTabSz="914400" rtl="0" eaLnBrk="1" latinLnBrk="1" hangingPunct="1">
+      <a:defRPr sz="1200" kern="1200">
+        <a:solidFill>
+          <a:schemeClr val="tx1"/>
+        </a:solidFill>
+        <a:latin typeface="+mn-lt"/>
+        <a:ea typeface="+mn-ea"/>
+        <a:cs typeface="+mn-cs"/>
+      </a:defRPr>
+    </a:lvl4pPr>
+    <a:lvl5pPr marL="1828800" algn="l" defTabSz="914400" rtl="0" eaLnBrk="1" latinLnBrk="1" hangingPunct="1">
+      <a:defRPr sz="1200" kern="1200">
+        <a:solidFill>
+          <a:schemeClr val="tx1"/>
+        </a:solidFill>
+        <a:latin typeface="+mn-lt"/>
+        <a:ea typeface="+mn-ea"/>
+        <a:cs typeface="+mn-cs"/>
+      </a:defRPr>
+    </a:lvl5pPr>
+    <a:lvl6pPr marL="2286000" algn="l" defTabSz="914400" rtl="0" eaLnBrk="1" latinLnBrk="1" hangingPunct="1">
+      <a:defRPr sz="1200" kern="1200">
+        <a:solidFill>
+          <a:schemeClr val="tx1"/>
+        </a:solidFill>
+        <a:latin typeface="+mn-lt"/>
+        <a:ea typeface="+mn-ea"/>
+        <a:cs typeface="+mn-cs"/>
+      </a:defRPr>
+    </a:lvl6pPr>
+    <a:lvl7pPr marL="2743200" algn="l" defTabSz="914400" rtl="0" eaLnBrk="1" latinLnBrk="1" hangingPunct="1">
+      <a:defRPr sz="1200" kern="1200">
+        <a:solidFill>
+          <a:schemeClr val="tx1"/>
+        </a:solidFill>
+        <a:latin typeface="+mn-lt"/>
+        <a:ea typeface="+mn-ea"/>
+        <a:cs typeface="+mn-cs"/>
+      </a:defRPr>
+    </a:lvl7pPr>
+    <a:lvl8pPr marL="3200400" algn="l" defTabSz="914400" rtl="0" eaLnBrk="1" latinLnBrk="1" hangingPunct="1">
+      <a:defRPr sz="1200" kern="1200">
+        <a:solidFill>
+          <a:schemeClr val="tx1"/>
+        </a:solidFill>
+        <a:latin typeface="+mn-lt"/>
+        <a:ea typeface="+mn-ea"/>
+        <a:cs typeface="+mn-cs"/>
+      </a:defRPr>
+    </a:lvl8pPr>
+    <a:lvl9pPr marL="3657600" algn="l" defTabSz="914400" rtl="0" eaLnBrk="1" latinLnBrk="1" hangingPunct="1">
+      <a:defRPr sz="1200" kern="1200">
+        <a:solidFill>
+          <a:schemeClr val="tx1"/>
+        </a:solidFill>
+        <a:latin typeface="+mn-lt"/>
+        <a:ea typeface="+mn-ea"/>
+        <a:cs typeface="+mn-cs"/>
+      </a:defRPr>
+    </a:lvl9pPr>
+  </p:notesStyle>
+</p:notesMaster>
+</file>
+
+<file path=ppt/notesSlides/notesSlide1.xml><?xml version="1.0" encoding="utf-8"?>
+<p:notes xmlns:a="http://schemas.openxmlformats.org/drawingml/2006/main" xmlns:r="http://schemas.openxmlformats.org/officeDocument/2006/relationships" xmlns:p="http://schemas.openxmlformats.org/presentationml/2006/main">
+  <p:cSld>
+    <p:spTree>
+      <p:nvGrpSpPr>
+        <p:cNvPr id="1" name=""/>
+        <p:cNvGrpSpPr/>
+        <p:nvPr/>
+      </p:nvGrpSpPr>
+      <p:grpSpPr>
+        <a:xfrm>
+          <a:off x="0" y="0"/>
+          <a:ext cx="0" cy="0"/>
+          <a:chOff x="0" y="0"/>
+          <a:chExt cx="0" cy="0"/>
+        </a:xfrm>
+      </p:grpSpPr>
+      <p:sp>
+        <p:nvSpPr>
+          <p:cNvPr id="2" name="슬라이드 이미지 개체 틀 1"/>
+          <p:cNvSpPr>
+            <a:spLocks noGrp="1" noRot="1" noChangeAspect="1"/>
+          </p:cNvSpPr>
+          <p:nvPr>
+            <p:ph type="sldImg"/>
+          </p:nvPr>
+        </p:nvSpPr>
+        <p:spPr/>
+      </p:sp>
+      <p:sp>
+        <p:nvSpPr>
+          <p:cNvPr id="3" name="슬라이드 노트 개체 틀 2"/>
+          <p:cNvSpPr>
+            <a:spLocks noGrp="1"/>
+          </p:cNvSpPr>
+          <p:nvPr>
+            <p:ph type="body" idx="1"/>
+          </p:nvPr>
+        </p:nvSpPr>
+        <p:spPr/>
+        <p:txBody>
+          <a:bodyPr/>
+          <a:lstStyle/>
+          <a:p>
+            <a:endParaRPr kumimoji="1" lang="ko-KR" altLang="en-US"/>
+          </a:p>
+        </p:txBody>
+      </p:sp>
+      <p:sp>
+        <p:nvSpPr>
+          <p:cNvPr id="4" name="슬라이드 번호 개체 틀 3"/>
+          <p:cNvSpPr>
+            <a:spLocks noGrp="1"/>
+          </p:cNvSpPr>
+          <p:nvPr>
+            <p:ph type="sldNum" sz="quarter" idx="10"/>
+          </p:nvPr>
+        </p:nvSpPr>
+        <p:spPr/>
+        <p:txBody>
+          <a:bodyPr/>
+          <a:lstStyle/>
+          <a:p>
+            <a:fld id="{B1DF0936-DD82-9B46-BEB4-C3050B2A9764}" type="slidenum">
+              <a:rPr kumimoji="1" lang="ko-KR" altLang="en-US" smtClean="0"/>
+              <a:t>7</a:t>
+            </a:fld>
+            <a:endParaRPr kumimoji="1" lang="ko-KR" altLang="en-US"/>
+          </a:p>
+        </p:txBody>
+      </p:sp>
+    </p:spTree>
+    <p:extLst>
+      <p:ext uri="{BB962C8B-B14F-4D97-AF65-F5344CB8AC3E}">
+        <p14:creationId xmlns:p14="http://schemas.microsoft.com/office/powerpoint/2010/main" val="905221098"/>
+      </p:ext>
+    </p:extLst>
+  </p:cSld>
+  <p:clrMapOvr>
+    <a:masterClrMapping/>
+  </p:clrMapOvr>
+</p:notes>
+</file>
+
 <file path=ppt/slideLayouts/slideLayout1.xml><?xml version="1.0" encoding="utf-8"?>
 <p:sldLayout xmlns:a="http://schemas.openxmlformats.org/drawingml/2006/main" xmlns:r="http://schemas.openxmlformats.org/officeDocument/2006/relationships" xmlns:p="http://schemas.openxmlformats.org/presentationml/2006/main" type="title" preserve="1">
   <p:cSld name="제목 슬라이드">
@@ -242,9 +682,9 @@
           <a:bodyPr/>
           <a:lstStyle/>
           <a:p>
-            <a:fld id="{BA1007D5-C137-334B-80C2-7B3954C6F992}" type="datetimeFigureOut">
-              <a:rPr kumimoji="1" lang="ko-KR" altLang="en-US" smtClean="0"/>
-              <a:t>2018. 6. 11.</a:t>
+            <a:fld id="{D7DECE4E-CFF3-7441-945D-BBC31B9284B7}" type="datetime1">
+              <a:rPr kumimoji="1" lang="ko-KR" altLang="en-US" smtClean="0"/>
+              <a:t>2018. 6. 12.</a:t>
             </a:fld>
             <a:endParaRPr kumimoji="1" lang="ko-KR" altLang="en-US"/>
           </a:p>
@@ -412,9 +852,9 @@
           <a:bodyPr/>
           <a:lstStyle/>
           <a:p>
-            <a:fld id="{BA1007D5-C137-334B-80C2-7B3954C6F992}" type="datetimeFigureOut">
-              <a:rPr kumimoji="1" lang="ko-KR" altLang="en-US" smtClean="0"/>
-              <a:t>2018. 6. 11.</a:t>
+            <a:fld id="{E977B70A-A71B-8443-AC80-E0997E7A6B0A}" type="datetime1">
+              <a:rPr kumimoji="1" lang="ko-KR" altLang="en-US" smtClean="0"/>
+              <a:t>2018. 6. 12.</a:t>
             </a:fld>
             <a:endParaRPr kumimoji="1" lang="ko-KR" altLang="en-US"/>
           </a:p>
@@ -592,9 +1032,9 @@
           <a:bodyPr/>
           <a:lstStyle/>
           <a:p>
-            <a:fld id="{BA1007D5-C137-334B-80C2-7B3954C6F992}" type="datetimeFigureOut">
-              <a:rPr kumimoji="1" lang="ko-KR" altLang="en-US" smtClean="0"/>
-              <a:t>2018. 6. 11.</a:t>
+            <a:fld id="{C7C6B333-DBD0-A348-8AC1-C7A2210FFFAF}" type="datetime1">
+              <a:rPr kumimoji="1" lang="ko-KR" altLang="en-US" smtClean="0"/>
+              <a:t>2018. 6. 12.</a:t>
             </a:fld>
             <a:endParaRPr kumimoji="1" lang="ko-KR" altLang="en-US"/>
           </a:p>
@@ -762,9 +1202,9 @@
           <a:bodyPr/>
           <a:lstStyle/>
           <a:p>
-            <a:fld id="{BA1007D5-C137-334B-80C2-7B3954C6F992}" type="datetimeFigureOut">
-              <a:rPr kumimoji="1" lang="ko-KR" altLang="en-US" smtClean="0"/>
-              <a:t>2018. 6. 11.</a:t>
+            <a:fld id="{0D395577-44C9-5E4C-A2AA-9EB96FC6F966}" type="datetime1">
+              <a:rPr kumimoji="1" lang="ko-KR" altLang="en-US" smtClean="0"/>
+              <a:t>2018. 6. 12.</a:t>
             </a:fld>
             <a:endParaRPr kumimoji="1" lang="ko-KR" altLang="en-US"/>
           </a:p>
@@ -1008,9 +1448,9 @@
           <a:bodyPr/>
           <a:lstStyle/>
           <a:p>
-            <a:fld id="{BA1007D5-C137-334B-80C2-7B3954C6F992}" type="datetimeFigureOut">
-              <a:rPr kumimoji="1" lang="ko-KR" altLang="en-US" smtClean="0"/>
-              <a:t>2018. 6. 11.</a:t>
+            <a:fld id="{5DE446C4-E683-6047-90FF-606560463954}" type="datetime1">
+              <a:rPr kumimoji="1" lang="ko-KR" altLang="en-US" smtClean="0"/>
+              <a:t>2018. 6. 12.</a:t>
             </a:fld>
             <a:endParaRPr kumimoji="1" lang="ko-KR" altLang="en-US"/>
           </a:p>
@@ -1240,9 +1680,9 @@
           <a:bodyPr/>
           <a:lstStyle/>
           <a:p>
-            <a:fld id="{BA1007D5-C137-334B-80C2-7B3954C6F992}" type="datetimeFigureOut">
-              <a:rPr kumimoji="1" lang="ko-KR" altLang="en-US" smtClean="0"/>
-              <a:t>2018. 6. 11.</a:t>
+            <a:fld id="{05644791-82B4-F24A-8ED7-F8093FB317D5}" type="datetime1">
+              <a:rPr kumimoji="1" lang="ko-KR" altLang="en-US" smtClean="0"/>
+              <a:t>2018. 6. 12.</a:t>
             </a:fld>
             <a:endParaRPr kumimoji="1" lang="ko-KR" altLang="en-US"/>
           </a:p>
@@ -1607,9 +2047,9 @@
           <a:bodyPr/>
           <a:lstStyle/>
           <a:p>
-            <a:fld id="{BA1007D5-C137-334B-80C2-7B3954C6F992}" type="datetimeFigureOut">
-              <a:rPr kumimoji="1" lang="ko-KR" altLang="en-US" smtClean="0"/>
-              <a:t>2018. 6. 11.</a:t>
+            <a:fld id="{66BA357C-B2A4-EA43-803C-F12BB8897A85}" type="datetime1">
+              <a:rPr kumimoji="1" lang="ko-KR" altLang="en-US" smtClean="0"/>
+              <a:t>2018. 6. 12.</a:t>
             </a:fld>
             <a:endParaRPr kumimoji="1" lang="ko-KR" altLang="en-US"/>
           </a:p>
@@ -1725,9 +2165,9 @@
           <a:bodyPr/>
           <a:lstStyle/>
           <a:p>
-            <a:fld id="{BA1007D5-C137-334B-80C2-7B3954C6F992}" type="datetimeFigureOut">
-              <a:rPr kumimoji="1" lang="ko-KR" altLang="en-US" smtClean="0"/>
-              <a:t>2018. 6. 11.</a:t>
+            <a:fld id="{7E2FD604-BA31-A443-98BB-732CD55ECDB1}" type="datetime1">
+              <a:rPr kumimoji="1" lang="ko-KR" altLang="en-US" smtClean="0"/>
+              <a:t>2018. 6. 12.</a:t>
             </a:fld>
             <a:endParaRPr kumimoji="1" lang="ko-KR" altLang="en-US"/>
           </a:p>
@@ -1820,9 +2260,9 @@
           <a:bodyPr/>
           <a:lstStyle/>
           <a:p>
-            <a:fld id="{BA1007D5-C137-334B-80C2-7B3954C6F992}" type="datetimeFigureOut">
-              <a:rPr kumimoji="1" lang="ko-KR" altLang="en-US" smtClean="0"/>
-              <a:t>2018. 6. 11.</a:t>
+            <a:fld id="{5EB36A19-E19A-7F45-BDE9-9FC183BD288C}" type="datetime1">
+              <a:rPr kumimoji="1" lang="ko-KR" altLang="en-US" smtClean="0"/>
+              <a:t>2018. 6. 12.</a:t>
             </a:fld>
             <a:endParaRPr kumimoji="1" lang="ko-KR" altLang="en-US"/>
           </a:p>
@@ -2097,9 +2537,9 @@
           <a:bodyPr/>
           <a:lstStyle/>
           <a:p>
-            <a:fld id="{BA1007D5-C137-334B-80C2-7B3954C6F992}" type="datetimeFigureOut">
-              <a:rPr kumimoji="1" lang="ko-KR" altLang="en-US" smtClean="0"/>
-              <a:t>2018. 6. 11.</a:t>
+            <a:fld id="{6BB5D679-B56B-E54A-A5B2-E44C0B0DF250}" type="datetime1">
+              <a:rPr kumimoji="1" lang="ko-KR" altLang="en-US" smtClean="0"/>
+              <a:t>2018. 6. 12.</a:t>
             </a:fld>
             <a:endParaRPr kumimoji="1" lang="ko-KR" altLang="en-US"/>
           </a:p>
@@ -2350,9 +2790,9 @@
           <a:bodyPr/>
           <a:lstStyle/>
           <a:p>
-            <a:fld id="{BA1007D5-C137-334B-80C2-7B3954C6F992}" type="datetimeFigureOut">
-              <a:rPr kumimoji="1" lang="ko-KR" altLang="en-US" smtClean="0"/>
-              <a:t>2018. 6. 11.</a:t>
+            <a:fld id="{2C8BB782-8F95-8C40-8FC0-65C51588B5D5}" type="datetime1">
+              <a:rPr kumimoji="1" lang="ko-KR" altLang="en-US" smtClean="0"/>
+              <a:t>2018. 6. 12.</a:t>
             </a:fld>
             <a:endParaRPr kumimoji="1" lang="ko-KR" altLang="en-US"/>
           </a:p>
@@ -2563,9 +3003,9 @@
             </a:lvl1pPr>
           </a:lstStyle>
           <a:p>
-            <a:fld id="{BA1007D5-C137-334B-80C2-7B3954C6F992}" type="datetimeFigureOut">
-              <a:rPr kumimoji="1" lang="ko-KR" altLang="en-US" smtClean="0"/>
-              <a:t>2018. 6. 11.</a:t>
+            <a:fld id="{BFBF7B73-B254-6242-8EE6-DCD66E4E83AC}" type="datetime1">
+              <a:rPr kumimoji="1" lang="ko-KR" altLang="en-US" smtClean="0"/>
+              <a:t>2018. 6. 12.</a:t>
             </a:fld>
             <a:endParaRPr kumimoji="1" lang="ko-KR" altLang="en-US"/>
           </a:p>
@@ -2670,6 +3110,7 @@
     <p:sldLayoutId id="2147483658" r:id="rId10"/>
     <p:sldLayoutId id="2147483659" r:id="rId11"/>
   </p:sldLayoutIdLst>
+  <p:hf hdr="0" ftr="0" dt="0"/>
   <p:txStyles>
     <p:titleStyle>
       <a:lvl1pPr algn="l" defTabSz="914400" rtl="0" eaLnBrk="1" latinLnBrk="1" hangingPunct="1">
@@ -3039,10 +3480,203 @@
           </a:p>
         </p:txBody>
       </p:sp>
+      <p:sp>
+        <p:nvSpPr>
+          <p:cNvPr id="5" name="슬라이드 번호 개체 틀 4"/>
+          <p:cNvSpPr>
+            <a:spLocks noGrp="1"/>
+          </p:cNvSpPr>
+          <p:nvPr>
+            <p:ph type="sldNum" sz="quarter" idx="12"/>
+          </p:nvPr>
+        </p:nvSpPr>
+        <p:spPr/>
+        <p:txBody>
+          <a:bodyPr/>
+          <a:lstStyle/>
+          <a:p>
+            <a:fld id="{F8F57085-8E57-544A-84B5-4A80B5D2F2B0}" type="slidenum">
+              <a:rPr kumimoji="1" lang="ko-KR" altLang="en-US" smtClean="0"/>
+              <a:t>1</a:t>
+            </a:fld>
+            <a:endParaRPr kumimoji="1" lang="ko-KR" altLang="en-US"/>
+          </a:p>
+        </p:txBody>
+      </p:sp>
     </p:spTree>
     <p:extLst>
       <p:ext uri="{BB962C8B-B14F-4D97-AF65-F5344CB8AC3E}">
         <p14:creationId xmlns:p14="http://schemas.microsoft.com/office/powerpoint/2010/main" val="157000168"/>
+      </p:ext>
+    </p:extLst>
+  </p:cSld>
+  <p:clrMapOvr>
+    <a:masterClrMapping/>
+  </p:clrMapOvr>
+</p:sld>
+</file>
+
+<file path=ppt/slides/slide10.xml><?xml version="1.0" encoding="utf-8"?>
+<p:sld xmlns:a="http://schemas.openxmlformats.org/drawingml/2006/main" xmlns:r="http://schemas.openxmlformats.org/officeDocument/2006/relationships" xmlns:p="http://schemas.openxmlformats.org/presentationml/2006/main">
+  <p:cSld>
+    <p:spTree>
+      <p:nvGrpSpPr>
+        <p:cNvPr id="1" name=""/>
+        <p:cNvGrpSpPr/>
+        <p:nvPr/>
+      </p:nvGrpSpPr>
+      <p:grpSpPr>
+        <a:xfrm>
+          <a:off x="0" y="0"/>
+          <a:ext cx="0" cy="0"/>
+          <a:chOff x="0" y="0"/>
+          <a:chExt cx="0" cy="0"/>
+        </a:xfrm>
+      </p:grpSpPr>
+      <p:sp>
+        <p:nvSpPr>
+          <p:cNvPr id="2" name="제목 1"/>
+          <p:cNvSpPr>
+            <a:spLocks noGrp="1"/>
+          </p:cNvSpPr>
+          <p:nvPr>
+            <p:ph type="title"/>
+          </p:nvPr>
+        </p:nvSpPr>
+        <p:spPr/>
+        <p:txBody>
+          <a:bodyPr/>
+          <a:lstStyle/>
+          <a:p>
+            <a:r>
+              <a:rPr kumimoji="1" lang="ko-KR" altLang="en-US" dirty="0" smtClean="0"/>
+              <a:t>참고자료</a:t>
+            </a:r>
+            <a:endParaRPr kumimoji="1" lang="ko-KR" altLang="en-US" dirty="0"/>
+          </a:p>
+        </p:txBody>
+      </p:sp>
+      <p:sp>
+        <p:nvSpPr>
+          <p:cNvPr id="3" name="내용 개체 틀 2"/>
+          <p:cNvSpPr>
+            <a:spLocks noGrp="1"/>
+          </p:cNvSpPr>
+          <p:nvPr>
+            <p:ph idx="1"/>
+          </p:nvPr>
+        </p:nvSpPr>
+        <p:spPr/>
+        <p:txBody>
+          <a:bodyPr/>
+          <a:lstStyle/>
+          <a:p>
+            <a:endParaRPr kumimoji="1" lang="en-US" altLang="ko-KR" dirty="0" smtClean="0"/>
+          </a:p>
+          <a:p>
+            <a:r>
+              <a:rPr lang="en-US" altLang="ko-KR" dirty="0"/>
+              <a:t>Athena </a:t>
+            </a:r>
+            <a:r>
+              <a:rPr lang="en-US" altLang="ko-KR" dirty="0" err="1"/>
+              <a:t>Stassopoulou</a:t>
+            </a:r>
+            <a:r>
+              <a:rPr lang="en-US" altLang="ko-KR" dirty="0"/>
+              <a:t> and </a:t>
+            </a:r>
+            <a:r>
+              <a:rPr lang="en-US" altLang="ko-KR" dirty="0" err="1"/>
+              <a:t>Marios</a:t>
+            </a:r>
+            <a:r>
+              <a:rPr lang="en-US" altLang="ko-KR" dirty="0"/>
+              <a:t> D </a:t>
+            </a:r>
+            <a:r>
+              <a:rPr lang="en-US" altLang="ko-KR" dirty="0" err="1"/>
+              <a:t>Dikaiakos</a:t>
+            </a:r>
+            <a:r>
+              <a:rPr lang="en-US" altLang="ko-KR" dirty="0"/>
+              <a:t>. 2006. </a:t>
+            </a:r>
+            <a:r>
+              <a:rPr lang="en-US" altLang="ko-KR" b="1" dirty="0"/>
+              <a:t>Crawler detection: </a:t>
+            </a:r>
+            <a:r>
+              <a:rPr lang="en-US" altLang="ko-KR" b="1" dirty="0" smtClean="0"/>
+              <a:t>A</a:t>
+            </a:r>
+            <a:r>
+              <a:rPr lang="ko-KR" altLang="en-US" b="1" dirty="0" smtClean="0"/>
+              <a:t> </a:t>
+            </a:r>
+            <a:r>
+              <a:rPr lang="en-US" altLang="ko-KR" b="1" dirty="0" err="1" smtClean="0"/>
+              <a:t>bayesian</a:t>
+            </a:r>
+            <a:r>
+              <a:rPr lang="en-US" altLang="ko-KR" b="1" dirty="0" smtClean="0"/>
+              <a:t> </a:t>
+            </a:r>
+            <a:r>
+              <a:rPr lang="en-US" altLang="ko-KR" b="1" dirty="0"/>
+              <a:t>approach. </a:t>
+            </a:r>
+            <a:r>
+              <a:rPr lang="en-US" altLang="ko-KR" dirty="0"/>
+              <a:t>In Internet Surveillance and Protection, 2006. ICISP’06. </a:t>
+            </a:r>
+            <a:r>
+              <a:rPr lang="en-US" altLang="ko-KR" dirty="0" smtClean="0"/>
+              <a:t>International</a:t>
+            </a:r>
+            <a:r>
+              <a:rPr lang="ko-KR" altLang="en-US" dirty="0" smtClean="0"/>
+              <a:t> </a:t>
+            </a:r>
+            <a:r>
+              <a:rPr lang="en-US" altLang="ko-KR" dirty="0" smtClean="0"/>
+              <a:t>Conference </a:t>
+            </a:r>
+            <a:r>
+              <a:rPr lang="en-US" altLang="ko-KR" dirty="0"/>
+              <a:t>on. IEEE, 16–16.</a:t>
+            </a:r>
+            <a:endParaRPr kumimoji="1" lang="ko-KR" altLang="en-US" dirty="0"/>
+          </a:p>
+        </p:txBody>
+      </p:sp>
+      <p:sp>
+        <p:nvSpPr>
+          <p:cNvPr id="4" name="슬라이드 번호 개체 틀 3"/>
+          <p:cNvSpPr>
+            <a:spLocks noGrp="1"/>
+          </p:cNvSpPr>
+          <p:nvPr>
+            <p:ph type="sldNum" sz="quarter" idx="12"/>
+          </p:nvPr>
+        </p:nvSpPr>
+        <p:spPr/>
+        <p:txBody>
+          <a:bodyPr/>
+          <a:lstStyle/>
+          <a:p>
+            <a:fld id="{F8F57085-8E57-544A-84B5-4A80B5D2F2B0}" type="slidenum">
+              <a:rPr kumimoji="1" lang="ko-KR" altLang="en-US" smtClean="0"/>
+              <a:t>10</a:t>
+            </a:fld>
+            <a:endParaRPr kumimoji="1" lang="ko-KR" altLang="en-US"/>
+          </a:p>
+        </p:txBody>
+      </p:sp>
+    </p:spTree>
+    <p:extLst>
+      <p:ext uri="{BB962C8B-B14F-4D97-AF65-F5344CB8AC3E}">
+        <p14:creationId xmlns:p14="http://schemas.microsoft.com/office/powerpoint/2010/main" val="495310925"/>
       </p:ext>
     </p:extLst>
   </p:cSld>
@@ -3164,6 +3798,29 @@
               <a:t>참고자료</a:t>
             </a:r>
             <a:endParaRPr kumimoji="1" lang="ko-KR" altLang="en-US" dirty="0"/>
+          </a:p>
+        </p:txBody>
+      </p:sp>
+      <p:sp>
+        <p:nvSpPr>
+          <p:cNvPr id="4" name="슬라이드 번호 개체 틀 3"/>
+          <p:cNvSpPr>
+            <a:spLocks noGrp="1"/>
+          </p:cNvSpPr>
+          <p:nvPr>
+            <p:ph type="sldNum" sz="quarter" idx="12"/>
+          </p:nvPr>
+        </p:nvSpPr>
+        <p:spPr/>
+        <p:txBody>
+          <a:bodyPr/>
+          <a:lstStyle/>
+          <a:p>
+            <a:fld id="{F8F57085-8E57-544A-84B5-4A80B5D2F2B0}" type="slidenum">
+              <a:rPr kumimoji="1" lang="ko-KR" altLang="en-US" smtClean="0"/>
+              <a:t>2</a:t>
+            </a:fld>
+            <a:endParaRPr kumimoji="1" lang="ko-KR" altLang="en-US"/>
           </a:p>
         </p:txBody>
       </p:sp>
@@ -3250,6 +3907,22 @@
             <a:endParaRPr kumimoji="1" lang="en-US" altLang="ko-KR" dirty="0" smtClean="0"/>
           </a:p>
           <a:p>
+            <a:pPr lvl="1"/>
+            <a:r>
+              <a:rPr kumimoji="1" lang="ko-KR" altLang="en-US" dirty="0" smtClean="0"/>
+              <a:t>발생 확률이 낮은 사건 지속 발생 시</a:t>
+            </a:r>
+            <a:r>
+              <a:rPr kumimoji="1" lang="en-US" altLang="ko-KR" dirty="0" smtClean="0"/>
+              <a:t>,</a:t>
+            </a:r>
+            <a:r>
+              <a:rPr kumimoji="1" lang="ko-KR" altLang="en-US" dirty="0" smtClean="0"/>
+              <a:t> 해당 주체 의심</a:t>
+            </a:r>
+            <a:endParaRPr kumimoji="1" lang="en-US" altLang="ko-KR" dirty="0" smtClean="0"/>
+          </a:p>
+          <a:p>
             <a:endParaRPr kumimoji="1" lang="en-US" altLang="ko-KR" dirty="0"/>
           </a:p>
           <a:p>
@@ -3266,22 +3939,6 @@
             <a:pPr lvl="1"/>
             <a:r>
               <a:rPr kumimoji="1" lang="ko-KR" altLang="en-US" dirty="0" smtClean="0"/>
-              <a:t>발생 확률이 낮은 사건 지속 발생 시</a:t>
-            </a:r>
-            <a:r>
-              <a:rPr kumimoji="1" lang="en-US" altLang="ko-KR" dirty="0" smtClean="0"/>
-              <a:t>,</a:t>
-            </a:r>
-            <a:r>
-              <a:rPr kumimoji="1" lang="ko-KR" altLang="en-US" dirty="0" smtClean="0"/>
-              <a:t> 해당 주체 의심</a:t>
-            </a:r>
-            <a:endParaRPr kumimoji="1" lang="en-US" altLang="ko-KR" dirty="0" smtClean="0"/>
-          </a:p>
-          <a:p>
-            <a:pPr lvl="1"/>
-            <a:r>
-              <a:rPr kumimoji="1" lang="ko-KR" altLang="en-US" dirty="0" smtClean="0"/>
               <a:t>웹트래픽을 분석하여 확률이 낮은 사건의 집합</a:t>
             </a:r>
             <a:r>
@@ -3290,9 +3947,76 @@
             </a:r>
             <a:r>
               <a:rPr kumimoji="1" lang="ko-KR" altLang="en-US" dirty="0" smtClean="0"/>
-              <a:t>을 정의</a:t>
+              <a:t> 정의</a:t>
+            </a:r>
+            <a:endParaRPr kumimoji="1" lang="en-US" altLang="ko-KR" dirty="0" smtClean="0"/>
+          </a:p>
+          <a:p>
+            <a:pPr lvl="1"/>
+            <a:r>
+              <a:rPr kumimoji="1" lang="en-US" altLang="ko-KR" dirty="0" smtClean="0"/>
+              <a:t>Long-tail</a:t>
+            </a:r>
+            <a:r>
+              <a:rPr kumimoji="1" lang="ko-KR" altLang="en-US" dirty="0" smtClean="0"/>
+              <a:t> 접근 </a:t>
+            </a:r>
+            <a:r>
+              <a:rPr kumimoji="1" lang="en-US" altLang="ko-KR" dirty="0" smtClean="0"/>
+              <a:t>IP</a:t>
+            </a:r>
+            <a:r>
+              <a:rPr kumimoji="1" lang="ko-KR" altLang="en-US" dirty="0" smtClean="0"/>
+              <a:t>들을 크롤러로 분류</a:t>
+            </a:r>
+            <a:r>
+              <a:rPr kumimoji="1" lang="en-US" altLang="ko-KR" dirty="0" smtClean="0"/>
+              <a:t>/</a:t>
+            </a:r>
+            <a:r>
+              <a:rPr kumimoji="1" lang="ko-KR" altLang="en-US" dirty="0" smtClean="0"/>
+              <a:t>블록</a:t>
+            </a:r>
+            <a:endParaRPr kumimoji="1" lang="en-US" altLang="ko-KR" dirty="0" smtClean="0"/>
+          </a:p>
+          <a:p>
+            <a:pPr lvl="1"/>
+            <a:r>
+              <a:rPr kumimoji="1" lang="ko-KR" altLang="en-US" dirty="0" smtClean="0"/>
+              <a:t>남아 있는 크롤러 </a:t>
+            </a:r>
+            <a:r>
+              <a:rPr kumimoji="1" lang="en-US" altLang="ko-KR" dirty="0" smtClean="0"/>
+              <a:t>IP</a:t>
+            </a:r>
+            <a:r>
+              <a:rPr kumimoji="1" lang="ko-KR" altLang="en-US" dirty="0" smtClean="0"/>
+              <a:t>들의 행동이 더 아웃라이어에 가까워짐</a:t>
             </a:r>
             <a:endParaRPr kumimoji="1" lang="ko-KR" altLang="en-US" dirty="0"/>
+          </a:p>
+        </p:txBody>
+      </p:sp>
+      <p:sp>
+        <p:nvSpPr>
+          <p:cNvPr id="4" name="슬라이드 번호 개체 틀 3"/>
+          <p:cNvSpPr>
+            <a:spLocks noGrp="1"/>
+          </p:cNvSpPr>
+          <p:nvPr>
+            <p:ph type="sldNum" sz="quarter" idx="12"/>
+          </p:nvPr>
+        </p:nvSpPr>
+        <p:spPr/>
+        <p:txBody>
+          <a:bodyPr/>
+          <a:lstStyle/>
+          <a:p>
+            <a:fld id="{F8F57085-8E57-544A-84B5-4A80B5D2F2B0}" type="slidenum">
+              <a:rPr kumimoji="1" lang="ko-KR" altLang="en-US" smtClean="0"/>
+              <a:t>3</a:t>
+            </a:fld>
+            <a:endParaRPr kumimoji="1" lang="ko-KR" altLang="en-US"/>
           </a:p>
         </p:txBody>
       </p:sp>
@@ -3426,9 +4150,36 @@
             <a:pPr lvl="1"/>
             <a:r>
               <a:rPr kumimoji="1" lang="ko-KR" altLang="en-US" dirty="0" smtClean="0"/>
-              <a:t>일반 사용자와 접근 패턴 상이</a:t>
-            </a:r>
-            <a:endParaRPr kumimoji="1" lang="en-US" altLang="ko-KR" dirty="0" smtClean="0"/>
+              <a:t>일반 사용자와 접근 패턴 상이 </a:t>
+            </a:r>
+            <a:r>
+              <a:rPr kumimoji="1" lang="en-US" altLang="ko-KR" dirty="0" smtClean="0"/>
+              <a:t>(</a:t>
+            </a:r>
+            <a:r>
+              <a:rPr kumimoji="1" lang="ko-KR" altLang="en-US" dirty="0" smtClean="0"/>
+              <a:t>예</a:t>
+            </a:r>
+            <a:r>
+              <a:rPr kumimoji="1" lang="en-US" altLang="ko-KR" dirty="0" smtClean="0"/>
+              <a:t>:</a:t>
+            </a:r>
+            <a:r>
+              <a:rPr kumimoji="1" lang="ko-KR" altLang="en-US" dirty="0" smtClean="0"/>
+              <a:t> </a:t>
+            </a:r>
+            <a:r>
+              <a:rPr kumimoji="1" lang="en-US" altLang="ko-KR" dirty="0" smtClean="0"/>
+              <a:t>UI</a:t>
+            </a:r>
+            <a:r>
+              <a:rPr kumimoji="1" lang="ko-KR" altLang="en-US" dirty="0" smtClean="0"/>
+              <a:t>를 거치지 않음</a:t>
+            </a:r>
+            <a:r>
+              <a:rPr kumimoji="1" lang="en-US" altLang="ko-KR" dirty="0" smtClean="0"/>
+              <a:t>)</a:t>
+            </a:r>
           </a:p>
           <a:p>
             <a:endParaRPr kumimoji="1" lang="en-US" altLang="ko-KR" dirty="0"/>
@@ -3475,6 +4226,29 @@
               <a:t>요청</a:t>
             </a:r>
             <a:endParaRPr kumimoji="1" lang="ko-KR" altLang="en-US" dirty="0"/>
+          </a:p>
+        </p:txBody>
+      </p:sp>
+      <p:sp>
+        <p:nvSpPr>
+          <p:cNvPr id="4" name="슬라이드 번호 개체 틀 3"/>
+          <p:cNvSpPr>
+            <a:spLocks noGrp="1"/>
+          </p:cNvSpPr>
+          <p:nvPr>
+            <p:ph type="sldNum" sz="quarter" idx="12"/>
+          </p:nvPr>
+        </p:nvSpPr>
+        <p:spPr/>
+        <p:txBody>
+          <a:bodyPr/>
+          <a:lstStyle/>
+          <a:p>
+            <a:fld id="{F8F57085-8E57-544A-84B5-4A80B5D2F2B0}" type="slidenum">
+              <a:rPr kumimoji="1" lang="ko-KR" altLang="en-US" smtClean="0"/>
+              <a:t>4</a:t>
+            </a:fld>
+            <a:endParaRPr kumimoji="1" lang="ko-KR" altLang="en-US"/>
           </a:p>
         </p:txBody>
       </p:sp>
@@ -3546,6 +4320,118 @@
           <a:bodyPr/>
           <a:lstStyle/>
           <a:p>
+            <a:r>
+              <a:rPr kumimoji="1" lang="ko-KR" altLang="en-US" dirty="0" smtClean="0"/>
+              <a:t>집중 영역인 </a:t>
+            </a:r>
+            <a:r>
+              <a:rPr kumimoji="1" lang="en-US" altLang="ko-KR" dirty="0" smtClean="0"/>
+              <a:t>Td1 </a:t>
+            </a:r>
+            <a:r>
+              <a:rPr kumimoji="1" lang="ko-KR" altLang="en-US" dirty="0" smtClean="0"/>
+              <a:t>제외</a:t>
+            </a:r>
+            <a:endParaRPr kumimoji="1" lang="en-US" altLang="ko-KR" dirty="0" smtClean="0"/>
+          </a:p>
+          <a:p>
+            <a:r>
+              <a:rPr kumimoji="1" lang="en-US" altLang="ko-KR" dirty="0" smtClean="0"/>
+              <a:t>Long-tail </a:t>
+            </a:r>
+            <a:r>
+              <a:rPr kumimoji="1" lang="ko-KR" altLang="en-US" dirty="0" smtClean="0"/>
+              <a:t>영역을</a:t>
+            </a:r>
+            <a:r>
+              <a:rPr kumimoji="1" lang="en-US" altLang="ko-KR" dirty="0" smtClean="0"/>
+              <a:t> </a:t>
+            </a:r>
+            <a:r>
+              <a:rPr kumimoji="1" lang="ko-KR" altLang="en-US" dirty="0" smtClean="0"/>
+              <a:t>사용</a:t>
+            </a:r>
+            <a:endParaRPr kumimoji="1" lang="en-US" altLang="ko-KR" dirty="0"/>
+          </a:p>
+          <a:p>
+            <a:pPr lvl="1"/>
+            <a:r>
+              <a:rPr kumimoji="1" lang="ko-KR" altLang="en-US" dirty="0" smtClean="0"/>
+              <a:t>평균 </a:t>
+            </a:r>
+            <a:r>
+              <a:rPr kumimoji="1" lang="en-US" altLang="ko-KR" dirty="0" smtClean="0"/>
+              <a:t>Td</a:t>
+            </a:r>
+            <a:r>
+              <a:rPr kumimoji="1" lang="ko-KR" altLang="en-US" dirty="0" smtClean="0"/>
+              <a:t>보다 낮은 </a:t>
+            </a:r>
+            <a:r>
+              <a:rPr kumimoji="1" lang="en-US" altLang="ko-KR" dirty="0" smtClean="0"/>
+              <a:t>threshold Td3</a:t>
+            </a:r>
+            <a:r>
+              <a:rPr kumimoji="1" lang="ko-KR" altLang="en-US" dirty="0" smtClean="0"/>
+              <a:t> 획득</a:t>
+            </a:r>
+            <a:endParaRPr kumimoji="1" lang="en-US" altLang="ko-KR" dirty="0" smtClean="0"/>
+          </a:p>
+          <a:p>
+            <a:pPr lvl="1"/>
+            <a:endParaRPr kumimoji="1" lang="ko-KR" altLang="en-US" dirty="0"/>
+          </a:p>
+        </p:txBody>
+      </p:sp>
+      <p:pic>
+        <p:nvPicPr>
+          <p:cNvPr id="7" name="그림 6"/>
+          <p:cNvPicPr>
+            <a:picLocks noChangeAspect="1"/>
+          </p:cNvPicPr>
+          <p:nvPr/>
+        </p:nvPicPr>
+        <p:blipFill>
+          <a:blip r:embed="rId2">
+            <a:extLst>
+              <a:ext uri="{28A0092B-C50C-407E-A947-70E740481C1C}">
+                <a14:useLocalDpi xmlns:a14="http://schemas.microsoft.com/office/drawing/2010/main" val="0"/>
+              </a:ext>
+            </a:extLst>
+          </a:blip>
+          <a:stretch>
+            <a:fillRect/>
+          </a:stretch>
+        </p:blipFill>
+        <p:spPr>
+          <a:xfrm>
+            <a:off x="6918093" y="1825625"/>
+            <a:ext cx="4645722" cy="4310987"/>
+          </a:xfrm>
+          <a:prstGeom prst="rect">
+            <a:avLst/>
+          </a:prstGeom>
+        </p:spPr>
+      </p:pic>
+      <p:sp>
+        <p:nvSpPr>
+          <p:cNvPr id="8" name="슬라이드 번호 개체 틀 7"/>
+          <p:cNvSpPr>
+            <a:spLocks noGrp="1"/>
+          </p:cNvSpPr>
+          <p:nvPr>
+            <p:ph type="sldNum" sz="quarter" idx="12"/>
+          </p:nvPr>
+        </p:nvSpPr>
+        <p:spPr/>
+        <p:txBody>
+          <a:bodyPr/>
+          <a:lstStyle/>
+          <a:p>
+            <a:fld id="{F8F57085-8E57-544A-84B5-4A80B5D2F2B0}" type="slidenum">
+              <a:rPr kumimoji="1" lang="ko-KR" altLang="en-US" smtClean="0"/>
+              <a:t>5</a:t>
+            </a:fld>
             <a:endParaRPr kumimoji="1" lang="ko-KR" altLang="en-US"/>
           </a:p>
         </p:txBody>
@@ -3597,7 +4483,15 @@
           <a:p>
             <a:r>
               <a:rPr kumimoji="1" lang="ko-KR" altLang="en-US" dirty="0" smtClean="0"/>
-              <a:t>실험 및 분석</a:t>
+              <a:t>분석 </a:t>
+            </a:r>
+            <a:r>
+              <a:rPr kumimoji="1" lang="mr-IN" altLang="ko-KR" dirty="0" smtClean="0"/>
+              <a:t>–</a:t>
+            </a:r>
+            <a:r>
+              <a:rPr kumimoji="1" lang="ko-KR" altLang="en-US" dirty="0" smtClean="0"/>
+              <a:t> 데이터 분포</a:t>
             </a:r>
             <a:endParaRPr kumimoji="1" lang="ko-KR" altLang="en-US" dirty="0"/>
           </a:p>
@@ -3618,6 +4512,168 @@
           <a:bodyPr/>
           <a:lstStyle/>
           <a:p>
+            <a:r>
+              <a:rPr kumimoji="1" lang="en-US" altLang="ko-KR" dirty="0" smtClean="0"/>
+              <a:t>NASA Web Traffic Log </a:t>
+            </a:r>
+            <a:r>
+              <a:rPr kumimoji="1" lang="ko-KR" altLang="en-US" dirty="0" smtClean="0"/>
+              <a:t>사용</a:t>
+            </a:r>
+            <a:endParaRPr kumimoji="1" lang="en-US" altLang="ko-KR" dirty="0" smtClean="0"/>
+          </a:p>
+          <a:p>
+            <a:r>
+              <a:rPr kumimoji="1" lang="ko-KR" altLang="en-US" dirty="0" smtClean="0"/>
+              <a:t>실제로 아이템 접근 빈도 </a:t>
+            </a:r>
+            <a:r>
+              <a:rPr kumimoji="1" lang="en-US" altLang="ko-KR" dirty="0" smtClean="0"/>
+              <a:t>power distribution</a:t>
+            </a:r>
+            <a:endParaRPr kumimoji="1" lang="ko-KR" altLang="en-US" dirty="0"/>
+          </a:p>
+        </p:txBody>
+      </p:sp>
+      <p:pic>
+        <p:nvPicPr>
+          <p:cNvPr id="5" name="그림 4"/>
+          <p:cNvPicPr>
+            <a:picLocks noChangeAspect="1"/>
+          </p:cNvPicPr>
+          <p:nvPr/>
+        </p:nvPicPr>
+        <p:blipFill>
+          <a:blip r:embed="rId2">
+            <a:extLst>
+              <a:ext uri="{28A0092B-C50C-407E-A947-70E740481C1C}">
+                <a14:useLocalDpi xmlns:a14="http://schemas.microsoft.com/office/drawing/2010/main" val="0"/>
+              </a:ext>
+            </a:extLst>
+          </a:blip>
+          <a:stretch>
+            <a:fillRect/>
+          </a:stretch>
+        </p:blipFill>
+        <p:spPr>
+          <a:xfrm>
+            <a:off x="-43951" y="3432898"/>
+            <a:ext cx="3155584" cy="3014289"/>
+          </a:xfrm>
+          <a:prstGeom prst="rect">
+            <a:avLst/>
+          </a:prstGeom>
+        </p:spPr>
+      </p:pic>
+      <p:pic>
+        <p:nvPicPr>
+          <p:cNvPr id="6" name="그림 5"/>
+          <p:cNvPicPr>
+            <a:picLocks noChangeAspect="1"/>
+          </p:cNvPicPr>
+          <p:nvPr/>
+        </p:nvPicPr>
+        <p:blipFill>
+          <a:blip r:embed="rId3">
+            <a:extLst>
+              <a:ext uri="{28A0092B-C50C-407E-A947-70E740481C1C}">
+                <a14:useLocalDpi xmlns:a14="http://schemas.microsoft.com/office/drawing/2010/main" val="0"/>
+              </a:ext>
+            </a:extLst>
+          </a:blip>
+          <a:stretch>
+            <a:fillRect/>
+          </a:stretch>
+        </p:blipFill>
+        <p:spPr>
+          <a:xfrm>
+            <a:off x="2972916" y="3432899"/>
+            <a:ext cx="3099065" cy="3014289"/>
+          </a:xfrm>
+          <a:prstGeom prst="rect">
+            <a:avLst/>
+          </a:prstGeom>
+        </p:spPr>
+      </p:pic>
+      <p:pic>
+        <p:nvPicPr>
+          <p:cNvPr id="7" name="그림 6"/>
+          <p:cNvPicPr>
+            <a:picLocks noChangeAspect="1"/>
+          </p:cNvPicPr>
+          <p:nvPr/>
+        </p:nvPicPr>
+        <p:blipFill>
+          <a:blip r:embed="rId4">
+            <a:extLst>
+              <a:ext uri="{28A0092B-C50C-407E-A947-70E740481C1C}">
+                <a14:useLocalDpi xmlns:a14="http://schemas.microsoft.com/office/drawing/2010/main" val="0"/>
+              </a:ext>
+            </a:extLst>
+          </a:blip>
+          <a:stretch>
+            <a:fillRect/>
+          </a:stretch>
+        </p:blipFill>
+        <p:spPr>
+          <a:xfrm>
+            <a:off x="6058349" y="3432900"/>
+            <a:ext cx="2976610" cy="3014288"/>
+          </a:xfrm>
+          <a:prstGeom prst="rect">
+            <a:avLst/>
+          </a:prstGeom>
+        </p:spPr>
+      </p:pic>
+      <p:pic>
+        <p:nvPicPr>
+          <p:cNvPr id="8" name="그림 7"/>
+          <p:cNvPicPr>
+            <a:picLocks noChangeAspect="1"/>
+          </p:cNvPicPr>
+          <p:nvPr/>
+        </p:nvPicPr>
+        <p:blipFill>
+          <a:blip r:embed="rId5">
+            <a:extLst>
+              <a:ext uri="{28A0092B-C50C-407E-A947-70E740481C1C}">
+                <a14:useLocalDpi xmlns:a14="http://schemas.microsoft.com/office/drawing/2010/main" val="0"/>
+              </a:ext>
+            </a:extLst>
+          </a:blip>
+          <a:stretch>
+            <a:fillRect/>
+          </a:stretch>
+        </p:blipFill>
+        <p:spPr>
+          <a:xfrm>
+            <a:off x="9135115" y="3432899"/>
+            <a:ext cx="3070806" cy="3014288"/>
+          </a:xfrm>
+          <a:prstGeom prst="rect">
+            <a:avLst/>
+          </a:prstGeom>
+        </p:spPr>
+      </p:pic>
+      <p:sp>
+        <p:nvSpPr>
+          <p:cNvPr id="9" name="슬라이드 번호 개체 틀 8"/>
+          <p:cNvSpPr>
+            <a:spLocks noGrp="1"/>
+          </p:cNvSpPr>
+          <p:nvPr>
+            <p:ph type="sldNum" sz="quarter" idx="12"/>
+          </p:nvPr>
+        </p:nvSpPr>
+        <p:spPr/>
+        <p:txBody>
+          <a:bodyPr/>
+          <a:lstStyle/>
+          <a:p>
+            <a:fld id="{F8F57085-8E57-544A-84B5-4A80B5D2F2B0}" type="slidenum">
+              <a:rPr kumimoji="1" lang="ko-KR" altLang="en-US" smtClean="0"/>
+              <a:t>6</a:t>
+            </a:fld>
             <a:endParaRPr kumimoji="1" lang="ko-KR" altLang="en-US"/>
           </a:p>
         </p:txBody>
@@ -3625,7 +4681,7 @@
     </p:spTree>
     <p:extLst>
       <p:ext uri="{BB962C8B-B14F-4D97-AF65-F5344CB8AC3E}">
-        <p14:creationId xmlns:p14="http://schemas.microsoft.com/office/powerpoint/2010/main" val="146330012"/>
+        <p14:creationId xmlns:p14="http://schemas.microsoft.com/office/powerpoint/2010/main" val="1800297651"/>
       </p:ext>
     </p:extLst>
   </p:cSld>
@@ -3669,7 +4725,15 @@
           <a:p>
             <a:r>
               <a:rPr kumimoji="1" lang="ko-KR" altLang="en-US" dirty="0" smtClean="0"/>
-              <a:t>참고자료</a:t>
+              <a:t>분석 </a:t>
+            </a:r>
+            <a:r>
+              <a:rPr kumimoji="1" lang="en-US" altLang="ko-KR" dirty="0" smtClean="0"/>
+              <a:t>-</a:t>
+            </a:r>
+            <a:r>
+              <a:rPr kumimoji="1" lang="ko-KR" altLang="en-US" dirty="0" smtClean="0"/>
+              <a:t> 시뮬레이션</a:t>
             </a:r>
             <a:endParaRPr kumimoji="1" lang="ko-KR" altLang="en-US" dirty="0"/>
           </a:p>
@@ -3690,89 +4754,445 @@
           <a:bodyPr/>
           <a:lstStyle/>
           <a:p>
-            <a:endParaRPr kumimoji="1" lang="en-US" altLang="ko-KR" dirty="0" smtClean="0"/>
-          </a:p>
-          <a:p>
-            <a:r>
-              <a:rPr lang="en-US" altLang="ko-KR" dirty="0"/>
-              <a:t>Athena </a:t>
-            </a:r>
-            <a:r>
-              <a:rPr lang="en-US" altLang="ko-KR" dirty="0" err="1"/>
-              <a:t>Stassopoulou</a:t>
-            </a:r>
-            <a:r>
-              <a:rPr lang="en-US" altLang="ko-KR" dirty="0"/>
-              <a:t> and </a:t>
-            </a:r>
-            <a:r>
-              <a:rPr lang="en-US" altLang="ko-KR" dirty="0" err="1"/>
-              <a:t>Marios</a:t>
-            </a:r>
-            <a:r>
-              <a:rPr lang="en-US" altLang="ko-KR" dirty="0"/>
-              <a:t> D </a:t>
-            </a:r>
-            <a:r>
-              <a:rPr lang="en-US" altLang="ko-KR" dirty="0" err="1"/>
-              <a:t>Dikaiakos</a:t>
-            </a:r>
-            <a:r>
-              <a:rPr lang="en-US" altLang="ko-KR" dirty="0"/>
-              <a:t>. 2006. </a:t>
-            </a:r>
-            <a:r>
-              <a:rPr lang="en-US" altLang="ko-KR" b="1" dirty="0"/>
-              <a:t>Crawler detection: </a:t>
-            </a:r>
-            <a:r>
-              <a:rPr lang="en-US" altLang="ko-KR" b="1" dirty="0" smtClean="0"/>
-              <a:t>A</a:t>
-            </a:r>
-            <a:r>
-              <a:rPr lang="ko-KR" altLang="en-US" b="1" dirty="0" smtClean="0"/>
-              <a:t> </a:t>
-            </a:r>
-            <a:r>
-              <a:rPr lang="en-US" altLang="ko-KR" b="1" dirty="0" err="1" smtClean="0"/>
-              <a:t>bayesian</a:t>
-            </a:r>
-            <a:r>
-              <a:rPr lang="en-US" altLang="ko-KR" b="1" dirty="0" smtClean="0"/>
-              <a:t> </a:t>
-            </a:r>
-            <a:r>
-              <a:rPr lang="en-US" altLang="ko-KR" b="1" dirty="0"/>
-              <a:t>approach. </a:t>
-            </a:r>
-            <a:r>
-              <a:rPr lang="en-US" altLang="ko-KR" dirty="0"/>
-              <a:t>In Internet Surveillance and Protection, 2006. ICISP’06. </a:t>
-            </a:r>
-            <a:r>
-              <a:rPr lang="en-US" altLang="ko-KR" dirty="0" smtClean="0"/>
-              <a:t>International</a:t>
-            </a:r>
-            <a:r>
-              <a:rPr lang="ko-KR" altLang="en-US" dirty="0" smtClean="0"/>
-              <a:t> </a:t>
-            </a:r>
-            <a:r>
-              <a:rPr lang="en-US" altLang="ko-KR" dirty="0" smtClean="0"/>
-              <a:t>Conference </a:t>
-            </a:r>
-            <a:r>
-              <a:rPr lang="en-US" altLang="ko-KR" dirty="0"/>
-              <a:t>on. IEEE, 16–16.</a:t>
+            <a:r>
+              <a:rPr kumimoji="1" lang="en-US" altLang="ko-KR" dirty="0" smtClean="0"/>
+              <a:t>LTM(Long-tail Threshold Model) </a:t>
+            </a:r>
+            <a:r>
+              <a:rPr kumimoji="1" lang="ko-KR" altLang="en-US" dirty="0" smtClean="0"/>
+              <a:t>사용 결과</a:t>
+            </a:r>
+            <a:r>
+              <a:rPr kumimoji="1" lang="en-US" altLang="ko-KR" dirty="0" smtClean="0"/>
+              <a:t>:</a:t>
+            </a:r>
+          </a:p>
+          <a:p>
+            <a:pPr lvl="1"/>
+            <a:r>
+              <a:rPr kumimoji="1" lang="en-US" altLang="ko-KR" dirty="0" smtClean="0"/>
+              <a:t>1,000</a:t>
+            </a:r>
+            <a:r>
+              <a:rPr kumimoji="1" lang="ko-KR" altLang="en-US" dirty="0" smtClean="0"/>
+              <a:t>개 </a:t>
+            </a:r>
+            <a:r>
+              <a:rPr kumimoji="1" lang="en-US" altLang="ko-KR" dirty="0" smtClean="0"/>
+              <a:t>IP</a:t>
+            </a:r>
+            <a:r>
+              <a:rPr kumimoji="1" lang="ko-KR" altLang="en-US" dirty="0" smtClean="0"/>
+              <a:t>로 분산 시킨 크롤러 시뮬레이션</a:t>
             </a:r>
             <a:endParaRPr kumimoji="1" lang="ko-KR" altLang="en-US" dirty="0"/>
+          </a:p>
+        </p:txBody>
+      </p:sp>
+      <p:pic>
+        <p:nvPicPr>
+          <p:cNvPr id="5" name="그림 4"/>
+          <p:cNvPicPr>
+            <a:picLocks noChangeAspect="1"/>
+          </p:cNvPicPr>
+          <p:nvPr/>
+        </p:nvPicPr>
+        <p:blipFill>
+          <a:blip r:embed="rId3">
+            <a:extLst>
+              <a:ext uri="{28A0092B-C50C-407E-A947-70E740481C1C}">
+                <a14:useLocalDpi xmlns:a14="http://schemas.microsoft.com/office/drawing/2010/main" val="0"/>
+              </a:ext>
+            </a:extLst>
+          </a:blip>
+          <a:stretch>
+            <a:fillRect/>
+          </a:stretch>
+        </p:blipFill>
+        <p:spPr>
+          <a:xfrm>
+            <a:off x="3299213" y="3127917"/>
+            <a:ext cx="4889500" cy="3200400"/>
+          </a:xfrm>
+          <a:prstGeom prst="rect">
+            <a:avLst/>
+          </a:prstGeom>
+        </p:spPr>
+      </p:pic>
+      <p:sp>
+        <p:nvSpPr>
+          <p:cNvPr id="6" name="슬라이드 번호 개체 틀 5"/>
+          <p:cNvSpPr>
+            <a:spLocks noGrp="1"/>
+          </p:cNvSpPr>
+          <p:nvPr>
+            <p:ph type="sldNum" sz="quarter" idx="12"/>
+          </p:nvPr>
+        </p:nvSpPr>
+        <p:spPr/>
+        <p:txBody>
+          <a:bodyPr/>
+          <a:lstStyle/>
+          <a:p>
+            <a:fld id="{F8F57085-8E57-544A-84B5-4A80B5D2F2B0}" type="slidenum">
+              <a:rPr kumimoji="1" lang="ko-KR" altLang="en-US" smtClean="0"/>
+              <a:t>7</a:t>
+            </a:fld>
+            <a:endParaRPr kumimoji="1" lang="ko-KR" altLang="en-US"/>
           </a:p>
         </p:txBody>
       </p:sp>
     </p:spTree>
     <p:extLst>
       <p:ext uri="{BB962C8B-B14F-4D97-AF65-F5344CB8AC3E}">
-        <p14:creationId xmlns:p14="http://schemas.microsoft.com/office/powerpoint/2010/main" val="495310925"/>
+        <p14:creationId xmlns:p14="http://schemas.microsoft.com/office/powerpoint/2010/main" val="146330012"/>
+      </p:ext>
+    </p:extLst>
+  </p:cSld>
+  <p:clrMapOvr>
+    <a:masterClrMapping/>
+  </p:clrMapOvr>
+</p:sld>
+</file>
+
+<file path=ppt/slides/slide8.xml><?xml version="1.0" encoding="utf-8"?>
+<p:sld xmlns:a="http://schemas.openxmlformats.org/drawingml/2006/main" xmlns:r="http://schemas.openxmlformats.org/officeDocument/2006/relationships" xmlns:p="http://schemas.openxmlformats.org/presentationml/2006/main">
+  <p:cSld>
+    <p:spTree>
+      <p:nvGrpSpPr>
+        <p:cNvPr id="1" name=""/>
+        <p:cNvGrpSpPr/>
+        <p:nvPr/>
+      </p:nvGrpSpPr>
+      <p:grpSpPr>
+        <a:xfrm>
+          <a:off x="0" y="0"/>
+          <a:ext cx="0" cy="0"/>
+          <a:chOff x="0" y="0"/>
+          <a:chExt cx="0" cy="0"/>
+        </a:xfrm>
+      </p:grpSpPr>
+      <p:sp>
+        <p:nvSpPr>
+          <p:cNvPr id="2" name="제목 1"/>
+          <p:cNvSpPr>
+            <a:spLocks noGrp="1"/>
+          </p:cNvSpPr>
+          <p:nvPr>
+            <p:ph type="title"/>
+          </p:nvPr>
+        </p:nvSpPr>
+        <p:spPr/>
+        <p:txBody>
+          <a:bodyPr/>
+          <a:lstStyle/>
+          <a:p>
+            <a:r>
+              <a:rPr kumimoji="1" lang="ko-KR" altLang="en-US" dirty="0" smtClean="0"/>
+              <a:t>실험 </a:t>
+            </a:r>
+            <a:r>
+              <a:rPr kumimoji="1" lang="mr-IN" altLang="ko-KR" dirty="0" smtClean="0"/>
+              <a:t>–</a:t>
+            </a:r>
+            <a:r>
+              <a:rPr kumimoji="1" lang="ko-KR" altLang="en-US" dirty="0" smtClean="0"/>
+              <a:t> 성능비교</a:t>
+            </a:r>
+            <a:endParaRPr kumimoji="1" lang="ko-KR" altLang="en-US" dirty="0"/>
+          </a:p>
+        </p:txBody>
+      </p:sp>
+      <p:sp>
+        <p:nvSpPr>
+          <p:cNvPr id="3" name="내용 개체 틀 2"/>
+          <p:cNvSpPr>
+            <a:spLocks noGrp="1"/>
+          </p:cNvSpPr>
+          <p:nvPr>
+            <p:ph idx="1"/>
+          </p:nvPr>
+        </p:nvSpPr>
+        <p:spPr/>
+        <p:txBody>
+          <a:bodyPr/>
+          <a:lstStyle/>
+          <a:p>
+            <a:r>
+              <a:rPr kumimoji="1" lang="ko-KR" altLang="en-US" dirty="0" smtClean="0"/>
+              <a:t>매우 낮은 오탐율</a:t>
+            </a:r>
+            <a:endParaRPr kumimoji="1" lang="ko-KR" altLang="en-US" dirty="0"/>
+          </a:p>
+        </p:txBody>
+      </p:sp>
+      <p:sp>
+        <p:nvSpPr>
+          <p:cNvPr id="4" name="슬라이드 번호 개체 틀 3"/>
+          <p:cNvSpPr>
+            <a:spLocks noGrp="1"/>
+          </p:cNvSpPr>
+          <p:nvPr>
+            <p:ph type="sldNum" sz="quarter" idx="12"/>
+          </p:nvPr>
+        </p:nvSpPr>
+        <p:spPr/>
+        <p:txBody>
+          <a:bodyPr/>
+          <a:lstStyle/>
+          <a:p>
+            <a:fld id="{F8F57085-8E57-544A-84B5-4A80B5D2F2B0}" type="slidenum">
+              <a:rPr kumimoji="1" lang="ko-KR" altLang="en-US" smtClean="0"/>
+              <a:t>8</a:t>
+            </a:fld>
+            <a:endParaRPr kumimoji="1" lang="ko-KR" altLang="en-US"/>
+          </a:p>
+        </p:txBody>
+      </p:sp>
+      <p:pic>
+        <p:nvPicPr>
+          <p:cNvPr id="5" name="그림 4"/>
+          <p:cNvPicPr>
+            <a:picLocks noChangeAspect="1"/>
+          </p:cNvPicPr>
+          <p:nvPr/>
+        </p:nvPicPr>
+        <p:blipFill>
+          <a:blip r:embed="rId2">
+            <a:extLst>
+              <a:ext uri="{28A0092B-C50C-407E-A947-70E740481C1C}">
+                <a14:useLocalDpi xmlns:a14="http://schemas.microsoft.com/office/drawing/2010/main" val="0"/>
+              </a:ext>
+            </a:extLst>
+          </a:blip>
+          <a:stretch>
+            <a:fillRect/>
+          </a:stretch>
+        </p:blipFill>
+        <p:spPr>
+          <a:xfrm>
+            <a:off x="6381684" y="2553630"/>
+            <a:ext cx="4972116" cy="3423424"/>
+          </a:xfrm>
+          <a:prstGeom prst="rect">
+            <a:avLst/>
+          </a:prstGeom>
+        </p:spPr>
+      </p:pic>
+      <p:pic>
+        <p:nvPicPr>
+          <p:cNvPr id="6" name="그림 5"/>
+          <p:cNvPicPr>
+            <a:picLocks noChangeAspect="1"/>
+          </p:cNvPicPr>
+          <p:nvPr/>
+        </p:nvPicPr>
+        <p:blipFill>
+          <a:blip r:embed="rId3"/>
+          <a:stretch>
+            <a:fillRect/>
+          </a:stretch>
+        </p:blipFill>
+        <p:spPr>
+          <a:xfrm>
+            <a:off x="1446147" y="2640439"/>
+            <a:ext cx="4327590" cy="3249806"/>
+          </a:xfrm>
+          <a:prstGeom prst="rect">
+            <a:avLst/>
+          </a:prstGeom>
+        </p:spPr>
+      </p:pic>
+    </p:spTree>
+    <p:extLst>
+      <p:ext uri="{BB962C8B-B14F-4D97-AF65-F5344CB8AC3E}">
+        <p14:creationId xmlns:p14="http://schemas.microsoft.com/office/powerpoint/2010/main" val="349475393"/>
+      </p:ext>
+    </p:extLst>
+  </p:cSld>
+  <p:clrMapOvr>
+    <a:masterClrMapping/>
+  </p:clrMapOvr>
+</p:sld>
+</file>
+
+<file path=ppt/slides/slide9.xml><?xml version="1.0" encoding="utf-8"?>
+<p:sld xmlns:a="http://schemas.openxmlformats.org/drawingml/2006/main" xmlns:r="http://schemas.openxmlformats.org/officeDocument/2006/relationships" xmlns:p="http://schemas.openxmlformats.org/presentationml/2006/main">
+  <p:cSld>
+    <p:spTree>
+      <p:nvGrpSpPr>
+        <p:cNvPr id="1" name=""/>
+        <p:cNvGrpSpPr/>
+        <p:nvPr/>
+      </p:nvGrpSpPr>
+      <p:grpSpPr>
+        <a:xfrm>
+          <a:off x="0" y="0"/>
+          <a:ext cx="0" cy="0"/>
+          <a:chOff x="0" y="0"/>
+          <a:chExt cx="0" cy="0"/>
+        </a:xfrm>
+      </p:grpSpPr>
+      <p:sp>
+        <p:nvSpPr>
+          <p:cNvPr id="2" name="제목 1"/>
+          <p:cNvSpPr>
+            <a:spLocks noGrp="1"/>
+          </p:cNvSpPr>
+          <p:nvPr>
+            <p:ph type="title"/>
+          </p:nvPr>
+        </p:nvSpPr>
+        <p:spPr/>
+        <p:txBody>
+          <a:bodyPr/>
+          <a:lstStyle/>
+          <a:p>
+            <a:r>
+              <a:rPr kumimoji="1" lang="ko-KR" altLang="en-US" dirty="0" smtClean="0"/>
+              <a:t>활용방안 </a:t>
+            </a:r>
+            <a:r>
+              <a:rPr kumimoji="1" lang="mr-IN" altLang="ko-KR" dirty="0" smtClean="0"/>
+              <a:t>–</a:t>
+            </a:r>
+            <a:r>
+              <a:rPr kumimoji="1" lang="ko-KR" altLang="en-US" dirty="0" smtClean="0"/>
+              <a:t> 댓글 매크로</a:t>
+            </a:r>
+            <a:endParaRPr kumimoji="1" lang="ko-KR" altLang="en-US" dirty="0"/>
+          </a:p>
+        </p:txBody>
+      </p:sp>
+      <p:sp>
+        <p:nvSpPr>
+          <p:cNvPr id="3" name="내용 개체 틀 2"/>
+          <p:cNvSpPr>
+            <a:spLocks noGrp="1"/>
+          </p:cNvSpPr>
+          <p:nvPr>
+            <p:ph idx="1"/>
+          </p:nvPr>
+        </p:nvSpPr>
+        <p:spPr/>
+        <p:txBody>
+          <a:bodyPr/>
+          <a:lstStyle/>
+          <a:p>
+            <a:r>
+              <a:rPr kumimoji="1" lang="ko-KR" altLang="en-US" dirty="0" smtClean="0"/>
+              <a:t>분산 동작 방식은 분산 크롤러와 유사</a:t>
+            </a:r>
+            <a:endParaRPr kumimoji="1" lang="en-US" altLang="ko-KR" dirty="0" smtClean="0"/>
+          </a:p>
+          <a:p>
+            <a:endParaRPr kumimoji="1" lang="en-US" altLang="ko-KR" dirty="0" smtClean="0"/>
+          </a:p>
+          <a:p>
+            <a:r>
+              <a:rPr kumimoji="1" lang="ko-KR" altLang="en-US" dirty="0" smtClean="0"/>
+              <a:t>목적 상이</a:t>
+            </a:r>
+            <a:r>
+              <a:rPr kumimoji="1" lang="en-US" altLang="ko-KR" dirty="0" smtClean="0"/>
+              <a:t>:</a:t>
+            </a:r>
+          </a:p>
+          <a:p>
+            <a:pPr lvl="1"/>
+            <a:r>
+              <a:rPr kumimoji="1" lang="ko-KR" altLang="en-US" dirty="0" smtClean="0"/>
+              <a:t>크롤러</a:t>
+            </a:r>
+            <a:r>
+              <a:rPr kumimoji="1" lang="en-US" altLang="ko-KR" dirty="0" smtClean="0"/>
+              <a:t>:</a:t>
+            </a:r>
+            <a:r>
+              <a:rPr kumimoji="1" lang="ko-KR" altLang="en-US" dirty="0" smtClean="0"/>
+              <a:t> 모든 아이템에 최소 수준 접근</a:t>
+            </a:r>
+            <a:endParaRPr kumimoji="1" lang="en-US" altLang="ko-KR" dirty="0" smtClean="0"/>
+          </a:p>
+          <a:p>
+            <a:pPr lvl="1"/>
+            <a:r>
+              <a:rPr kumimoji="1" lang="ko-KR" altLang="en-US" dirty="0" smtClean="0"/>
+              <a:t>댓글툴</a:t>
+            </a:r>
+            <a:r>
+              <a:rPr kumimoji="1" lang="en-US" altLang="ko-KR" dirty="0" smtClean="0"/>
+              <a:t>:</a:t>
+            </a:r>
+            <a:r>
+              <a:rPr kumimoji="1" lang="ko-KR" altLang="en-US" dirty="0" smtClean="0"/>
+              <a:t> 특정 아이템에 집중적으로 접근</a:t>
+            </a:r>
+            <a:endParaRPr kumimoji="1" lang="en-US" altLang="ko-KR" dirty="0" smtClean="0"/>
+          </a:p>
+          <a:p>
+            <a:pPr lvl="1"/>
+            <a:endParaRPr kumimoji="1" lang="en-US" altLang="ko-KR" dirty="0"/>
+          </a:p>
+          <a:p>
+            <a:r>
+              <a:rPr kumimoji="1" lang="ko-KR" altLang="en-US" dirty="0" smtClean="0"/>
+              <a:t>선결 사항</a:t>
+            </a:r>
+            <a:r>
+              <a:rPr kumimoji="1" lang="en-US" altLang="ko-KR" dirty="0" smtClean="0"/>
+              <a:t>:</a:t>
+            </a:r>
+          </a:p>
+          <a:p>
+            <a:pPr lvl="1"/>
+            <a:r>
+              <a:rPr kumimoji="1" lang="ko-KR" altLang="en-US" dirty="0" smtClean="0"/>
+              <a:t>댓글툴의 동작 방식에 대한 도메인 지식 필요</a:t>
+            </a:r>
+            <a:endParaRPr kumimoji="1" lang="en-US" altLang="ko-KR" dirty="0"/>
+          </a:p>
+          <a:p>
+            <a:pPr lvl="1"/>
+            <a:r>
+              <a:rPr kumimoji="1" lang="en-US" altLang="ko-KR" dirty="0" smtClean="0"/>
+              <a:t>Long-tail</a:t>
+            </a:r>
+            <a:r>
+              <a:rPr kumimoji="1" lang="ko-KR" altLang="en-US" dirty="0" smtClean="0"/>
+              <a:t>을 다른 방식으로 구축 필요</a:t>
+            </a:r>
+            <a:endParaRPr kumimoji="1" lang="ko-KR" altLang="en-US" dirty="0"/>
+          </a:p>
+        </p:txBody>
+      </p:sp>
+      <p:sp>
+        <p:nvSpPr>
+          <p:cNvPr id="4" name="슬라이드 번호 개체 틀 3"/>
+          <p:cNvSpPr>
+            <a:spLocks noGrp="1"/>
+          </p:cNvSpPr>
+          <p:nvPr>
+            <p:ph type="sldNum" sz="quarter" idx="12"/>
+          </p:nvPr>
+        </p:nvSpPr>
+        <p:spPr/>
+        <p:txBody>
+          <a:bodyPr/>
+          <a:lstStyle/>
+          <a:p>
+            <a:fld id="{F8F57085-8E57-544A-84B5-4A80B5D2F2B0}" type="slidenum">
+              <a:rPr kumimoji="1" lang="ko-KR" altLang="en-US" smtClean="0"/>
+              <a:t>9</a:t>
+            </a:fld>
+            <a:endParaRPr kumimoji="1" lang="ko-KR" altLang="en-US"/>
+          </a:p>
+        </p:txBody>
+      </p:sp>
+    </p:spTree>
+    <p:extLst>
+      <p:ext uri="{BB962C8B-B14F-4D97-AF65-F5344CB8AC3E}">
+        <p14:creationId xmlns:p14="http://schemas.microsoft.com/office/powerpoint/2010/main" val="520535143"/>
       </p:ext>
     </p:extLst>
   </p:cSld>
@@ -4041,4 +5461,265 @@
     </a:ext>
   </a:extLst>
 </a:theme>
+</file>
+
+<file path=ppt/theme/theme2.xml><?xml version="1.0" encoding="utf-8"?>
+<a:theme xmlns:a="http://schemas.openxmlformats.org/drawingml/2006/main" name="Office 테마">
+  <a:themeElements>
+    <a:clrScheme name="Office">
+      <a:dk1>
+        <a:sysClr val="windowText" lastClr="000000"/>
+      </a:dk1>
+      <a:lt1>
+        <a:sysClr val="window" lastClr="FFFFFF"/>
+      </a:lt1>
+      <a:dk2>
+        <a:srgbClr val="44546A"/>
+      </a:dk2>
+      <a:lt2>
+        <a:srgbClr val="E7E6E6"/>
+      </a:lt2>
+      <a:accent1>
+        <a:srgbClr val="5B9BD5"/>
+      </a:accent1>
+      <a:accent2>
+        <a:srgbClr val="ED7D31"/>
+      </a:accent2>
+      <a:accent3>
+        <a:srgbClr val="A5A5A5"/>
+      </a:accent3>
+      <a:accent4>
+        <a:srgbClr val="FFC000"/>
+      </a:accent4>
+      <a:accent5>
+        <a:srgbClr val="4472C4"/>
+      </a:accent5>
+      <a:accent6>
+        <a:srgbClr val="70AD47"/>
+      </a:accent6>
+      <a:hlink>
+        <a:srgbClr val="0563C1"/>
+      </a:hlink>
+      <a:folHlink>
+        <a:srgbClr val="954F72"/>
+      </a:folHlink>
+    </a:clrScheme>
+    <a:fontScheme name="Office">
+      <a:majorFont>
+        <a:latin typeface="맑은 고딕" panose="020F0302020204030204"/>
+        <a:ea typeface=""/>
+        <a:cs typeface=""/>
+        <a:font script="Jpan" typeface="Yu Gothic Light"/>
+        <a:font script="Hang" typeface="맑은 고딕"/>
+        <a:font script="Hans" typeface="DengXian Light"/>
+        <a:font script="Hant" typeface="新細明體"/>
+        <a:font script="Arab" typeface="Times New Roman"/>
+        <a:font script="Hebr" typeface="Times New Roman"/>
+        <a:font script="Thai" typeface="Angsana New"/>
+        <a:font script="Ethi" typeface="Nyala"/>
+        <a:font script="Beng" typeface="Vrinda"/>
+        <a:font script="Gujr" typeface="Shruti"/>
+        <a:font script="Khmr" typeface="MoolBoran"/>
+        <a:font script="Knda" typeface="Tunga"/>
+        <a:font script="Guru" typeface="Raavi"/>
+        <a:font script="Cans" typeface="Euphemia"/>
+        <a:font script="Cher" typeface="Plantagenet Cherokee"/>
+        <a:font script="Yiii" typeface="Microsoft Yi Baiti"/>
+        <a:font script="Tibt" typeface="Microsoft Himalaya"/>
+        <a:font script="Thaa" typeface="MV Boli"/>
+        <a:font script="Deva" typeface="Mangal"/>
+        <a:font script="Telu" typeface="Gautami"/>
+        <a:font script="Taml" typeface="Latha"/>
+        <a:font script="Syrc" typeface="Estrangelo Edessa"/>
+        <a:font script="Orya" typeface="Kalinga"/>
+        <a:font script="Mlym" typeface="Kartika"/>
+        <a:font script="Laoo" typeface="DokChampa"/>
+        <a:font script="Sinh" typeface="Iskoola Pota"/>
+        <a:font script="Mong" typeface="Mongolian Baiti"/>
+        <a:font script="Viet" typeface="Times New Roman"/>
+        <a:font script="Uigh" typeface="Microsoft Uighur"/>
+        <a:font script="Geor" typeface="Sylfaen"/>
+      </a:majorFont>
+      <a:minorFont>
+        <a:latin typeface="맑은 고딕" panose="020F0502020204030204"/>
+        <a:ea typeface=""/>
+        <a:cs typeface=""/>
+        <a:font script="Jpan" typeface="Yu Gothic"/>
+        <a:font script="Hang" typeface="맑은 고딕"/>
+        <a:font script="Hans" typeface="DengXian"/>
+        <a:font script="Hant" typeface="新細明體"/>
+        <a:font script="Arab" typeface="Arial"/>
+        <a:font script="Hebr" typeface="Arial"/>
+        <a:font script="Thai" typeface="Cordia New"/>
+        <a:font script="Ethi" typeface="Nyala"/>
+        <a:font script="Beng" typeface="Vrinda"/>
+        <a:font script="Gujr" typeface="Shruti"/>
+        <a:font script="Khmr" typeface="DaunPenh"/>
+        <a:font script="Knda" typeface="Tunga"/>
+        <a:font script="Guru" typeface="Raavi"/>
+        <a:font script="Cans" typeface="Euphemia"/>
+        <a:font script="Cher" typeface="Plantagenet Cherokee"/>
+        <a:font script="Yiii" typeface="Microsoft Yi Baiti"/>
+        <a:font script="Tibt" typeface="Microsoft Himalaya"/>
+        <a:font script="Thaa" typeface="MV Boli"/>
+        <a:font script="Deva" typeface="Mangal"/>
+        <a:font script="Telu" typeface="Gautami"/>
+        <a:font script="Taml" typeface="Latha"/>
+        <a:font script="Syrc" typeface="Estrangelo Edessa"/>
+        <a:font script="Orya" typeface="Kalinga"/>
+        <a:font script="Mlym" typeface="Kartika"/>
+        <a:font script="Laoo" typeface="DokChampa"/>
+        <a:font script="Sinh" typeface="Iskoola Pota"/>
+        <a:font script="Mong" typeface="Mongolian Baiti"/>
+        <a:font script="Viet" typeface="Arial"/>
+        <a:font script="Uigh" typeface="Microsoft Uighur"/>
+        <a:font script="Geor" typeface="Sylfaen"/>
+      </a:minorFont>
+    </a:fontScheme>
+    <a:fmtScheme name="Office">
+      <a:fillStyleLst>
+        <a:solidFill>
+          <a:schemeClr val="phClr"/>
+        </a:solidFill>
+        <a:gradFill rotWithShape="1">
+          <a:gsLst>
+            <a:gs pos="0">
+              <a:schemeClr val="phClr">
+                <a:lumMod val="110000"/>
+                <a:satMod val="105000"/>
+                <a:tint val="67000"/>
+              </a:schemeClr>
+            </a:gs>
+            <a:gs pos="50000">
+              <a:schemeClr val="phClr">
+                <a:lumMod val="105000"/>
+                <a:satMod val="103000"/>
+                <a:tint val="73000"/>
+              </a:schemeClr>
+            </a:gs>
+            <a:gs pos="100000">
+              <a:schemeClr val="phClr">
+                <a:lumMod val="105000"/>
+                <a:satMod val="109000"/>
+                <a:tint val="81000"/>
+              </a:schemeClr>
+            </a:gs>
+          </a:gsLst>
+          <a:lin ang="5400000" scaled="0"/>
+        </a:gradFill>
+        <a:gradFill rotWithShape="1">
+          <a:gsLst>
+            <a:gs pos="0">
+              <a:schemeClr val="phClr">
+                <a:satMod val="103000"/>
+                <a:lumMod val="102000"/>
+                <a:tint val="94000"/>
+              </a:schemeClr>
+            </a:gs>
+            <a:gs pos="50000">
+              <a:schemeClr val="phClr">
+                <a:satMod val="110000"/>
+                <a:lumMod val="100000"/>
+                <a:shade val="100000"/>
+              </a:schemeClr>
+            </a:gs>
+            <a:gs pos="100000">
+              <a:schemeClr val="phClr">
+                <a:lumMod val="99000"/>
+                <a:satMod val="120000"/>
+                <a:shade val="78000"/>
+              </a:schemeClr>
+            </a:gs>
+          </a:gsLst>
+          <a:lin ang="5400000" scaled="0"/>
+        </a:gradFill>
+      </a:fillStyleLst>
+      <a:lnStyleLst>
+        <a:ln w="6350" cap="flat" cmpd="sng" algn="ctr">
+          <a:solidFill>
+            <a:schemeClr val="phClr"/>
+          </a:solidFill>
+          <a:prstDash val="solid"/>
+          <a:miter lim="800000"/>
+        </a:ln>
+        <a:ln w="12700" cap="flat" cmpd="sng" algn="ctr">
+          <a:solidFill>
+            <a:schemeClr val="phClr"/>
+          </a:solidFill>
+          <a:prstDash val="solid"/>
+          <a:miter lim="800000"/>
+        </a:ln>
+        <a:ln w="19050" cap="flat" cmpd="sng" algn="ctr">
+          <a:solidFill>
+            <a:schemeClr val="phClr"/>
+          </a:solidFill>
+          <a:prstDash val="solid"/>
+          <a:miter lim="800000"/>
+        </a:ln>
+      </a:lnStyleLst>
+      <a:effectStyleLst>
+        <a:effectStyle>
+          <a:effectLst/>
+        </a:effectStyle>
+        <a:effectStyle>
+          <a:effectLst/>
+        </a:effectStyle>
+        <a:effectStyle>
+          <a:effectLst>
+            <a:outerShdw blurRad="57150" dist="19050" dir="5400000" algn="ctr" rotWithShape="0">
+              <a:srgbClr val="000000">
+                <a:alpha val="63000"/>
+              </a:srgbClr>
+            </a:outerShdw>
+          </a:effectLst>
+        </a:effectStyle>
+      </a:effectStyleLst>
+      <a:bgFillStyleLst>
+        <a:solidFill>
+          <a:schemeClr val="phClr"/>
+        </a:solidFill>
+        <a:solidFill>
+          <a:schemeClr val="phClr">
+            <a:tint val="95000"/>
+            <a:satMod val="170000"/>
+          </a:schemeClr>
+        </a:solidFill>
+        <a:gradFill rotWithShape="1">
+          <a:gsLst>
+            <a:gs pos="0">
+              <a:schemeClr val="phClr">
+                <a:tint val="93000"/>
+                <a:satMod val="150000"/>
+                <a:shade val="98000"/>
+                <a:lumMod val="102000"/>
+              </a:schemeClr>
+            </a:gs>
+            <a:gs pos="50000">
+              <a:schemeClr val="phClr">
+                <a:tint val="98000"/>
+                <a:satMod val="130000"/>
+                <a:shade val="90000"/>
+                <a:lumMod val="103000"/>
+              </a:schemeClr>
+            </a:gs>
+            <a:gs pos="100000">
+              <a:schemeClr val="phClr">
+                <a:shade val="63000"/>
+                <a:satMod val="120000"/>
+              </a:schemeClr>
+            </a:gs>
+          </a:gsLst>
+          <a:lin ang="5400000" scaled="0"/>
+        </a:gradFill>
+      </a:bgFillStyleLst>
+    </a:fmtScheme>
+  </a:themeElements>
+  <a:objectDefaults/>
+  <a:extraClrSchemeLst/>
+  <a:extLst>
+    <a:ext uri="{05A4C25C-085E-4340-85A3-A5531E510DB2}">
+      <thm15:themeFamily xmlns:thm15="http://schemas.microsoft.com/office/thememl/2012/main" name="Office Theme" id="{62F939B6-93AF-4DB8-9C6B-D6C7DFDC589F}" vid="{4A3C46E8-61CC-4603-A589-7422A47A8E4A}"/>
+    </a:ext>
+  </a:extLst>
+</a:theme>
 </file>
</xml_diff>

<commit_message>
english correction related works
</commit_message>
<xml_diff>
--- a/30_Presentation/AntiCrawlerLTM_노인우_20180611.pptx
+++ b/30_Presentation/AntiCrawlerLTM_노인우_20180611.pptx
@@ -116,6 +116,11 @@
       </a:defRPr>
     </a:lvl9pPr>
   </p:defaultTextStyle>
+  <p:extLst>
+    <p:ext uri="{EFAFB233-063F-42B5-8137-9DF3F51BA10A}">
+      <p15:sldGuideLst xmlns:p15="http://schemas.microsoft.com/office/powerpoint/2012/main"/>
+    </p:ext>
+  </p:extLst>
 </p:presentation>
 </file>
 
@@ -201,7 +206,7 @@
           <a:p>
             <a:fld id="{25362424-2B4C-6343-B6FD-6859BE7BBBBF}" type="datetimeFigureOut">
               <a:rPr kumimoji="1" lang="ko-KR" altLang="en-US" smtClean="0"/>
-              <a:t>2018. 6. 12.</a:t>
+              <a:t>2018. 6. 14.</a:t>
             </a:fld>
             <a:endParaRPr kumimoji="1" lang="ko-KR" altLang="en-US"/>
           </a:p>
@@ -684,7 +689,7 @@
           <a:p>
             <a:fld id="{D7DECE4E-CFF3-7441-945D-BBC31B9284B7}" type="datetime1">
               <a:rPr kumimoji="1" lang="ko-KR" altLang="en-US" smtClean="0"/>
-              <a:t>2018. 6. 12.</a:t>
+              <a:t>2018. 6. 14.</a:t>
             </a:fld>
             <a:endParaRPr kumimoji="1" lang="ko-KR" altLang="en-US"/>
           </a:p>
@@ -854,7 +859,7 @@
           <a:p>
             <a:fld id="{E977B70A-A71B-8443-AC80-E0997E7A6B0A}" type="datetime1">
               <a:rPr kumimoji="1" lang="ko-KR" altLang="en-US" smtClean="0"/>
-              <a:t>2018. 6. 12.</a:t>
+              <a:t>2018. 6. 14.</a:t>
             </a:fld>
             <a:endParaRPr kumimoji="1" lang="ko-KR" altLang="en-US"/>
           </a:p>
@@ -1034,7 +1039,7 @@
           <a:p>
             <a:fld id="{C7C6B333-DBD0-A348-8AC1-C7A2210FFFAF}" type="datetime1">
               <a:rPr kumimoji="1" lang="ko-KR" altLang="en-US" smtClean="0"/>
-              <a:t>2018. 6. 12.</a:t>
+              <a:t>2018. 6. 14.</a:t>
             </a:fld>
             <a:endParaRPr kumimoji="1" lang="ko-KR" altLang="en-US"/>
           </a:p>
@@ -1204,7 +1209,7 @@
           <a:p>
             <a:fld id="{0D395577-44C9-5E4C-A2AA-9EB96FC6F966}" type="datetime1">
               <a:rPr kumimoji="1" lang="ko-KR" altLang="en-US" smtClean="0"/>
-              <a:t>2018. 6. 12.</a:t>
+              <a:t>2018. 6. 14.</a:t>
             </a:fld>
             <a:endParaRPr kumimoji="1" lang="ko-KR" altLang="en-US"/>
           </a:p>
@@ -1450,7 +1455,7 @@
           <a:p>
             <a:fld id="{5DE446C4-E683-6047-90FF-606560463954}" type="datetime1">
               <a:rPr kumimoji="1" lang="ko-KR" altLang="en-US" smtClean="0"/>
-              <a:t>2018. 6. 12.</a:t>
+              <a:t>2018. 6. 14.</a:t>
             </a:fld>
             <a:endParaRPr kumimoji="1" lang="ko-KR" altLang="en-US"/>
           </a:p>
@@ -1682,7 +1687,7 @@
           <a:p>
             <a:fld id="{05644791-82B4-F24A-8ED7-F8093FB317D5}" type="datetime1">
               <a:rPr kumimoji="1" lang="ko-KR" altLang="en-US" smtClean="0"/>
-              <a:t>2018. 6. 12.</a:t>
+              <a:t>2018. 6. 14.</a:t>
             </a:fld>
             <a:endParaRPr kumimoji="1" lang="ko-KR" altLang="en-US"/>
           </a:p>
@@ -2049,7 +2054,7 @@
           <a:p>
             <a:fld id="{66BA357C-B2A4-EA43-803C-F12BB8897A85}" type="datetime1">
               <a:rPr kumimoji="1" lang="ko-KR" altLang="en-US" smtClean="0"/>
-              <a:t>2018. 6. 12.</a:t>
+              <a:t>2018. 6. 14.</a:t>
             </a:fld>
             <a:endParaRPr kumimoji="1" lang="ko-KR" altLang="en-US"/>
           </a:p>
@@ -2167,7 +2172,7 @@
           <a:p>
             <a:fld id="{7E2FD604-BA31-A443-98BB-732CD55ECDB1}" type="datetime1">
               <a:rPr kumimoji="1" lang="ko-KR" altLang="en-US" smtClean="0"/>
-              <a:t>2018. 6. 12.</a:t>
+              <a:t>2018. 6. 14.</a:t>
             </a:fld>
             <a:endParaRPr kumimoji="1" lang="ko-KR" altLang="en-US"/>
           </a:p>
@@ -2262,7 +2267,7 @@
           <a:p>
             <a:fld id="{5EB36A19-E19A-7F45-BDE9-9FC183BD288C}" type="datetime1">
               <a:rPr kumimoji="1" lang="ko-KR" altLang="en-US" smtClean="0"/>
-              <a:t>2018. 6. 12.</a:t>
+              <a:t>2018. 6. 14.</a:t>
             </a:fld>
             <a:endParaRPr kumimoji="1" lang="ko-KR" altLang="en-US"/>
           </a:p>
@@ -2539,7 +2544,7 @@
           <a:p>
             <a:fld id="{6BB5D679-B56B-E54A-A5B2-E44C0B0DF250}" type="datetime1">
               <a:rPr kumimoji="1" lang="ko-KR" altLang="en-US" smtClean="0"/>
-              <a:t>2018. 6. 12.</a:t>
+              <a:t>2018. 6. 14.</a:t>
             </a:fld>
             <a:endParaRPr kumimoji="1" lang="ko-KR" altLang="en-US"/>
           </a:p>
@@ -2792,7 +2797,7 @@
           <a:p>
             <a:fld id="{2C8BB782-8F95-8C40-8FC0-65C51588B5D5}" type="datetime1">
               <a:rPr kumimoji="1" lang="ko-KR" altLang="en-US" smtClean="0"/>
-              <a:t>2018. 6. 12.</a:t>
+              <a:t>2018. 6. 14.</a:t>
             </a:fld>
             <a:endParaRPr kumimoji="1" lang="ko-KR" altLang="en-US"/>
           </a:p>
@@ -3005,7 +3010,7 @@
           <a:p>
             <a:fld id="{BFBF7B73-B254-6242-8EE6-DCD66E4E83AC}" type="datetime1">
               <a:rPr kumimoji="1" lang="ko-KR" altLang="en-US" smtClean="0"/>
-              <a:t>2018. 6. 12.</a:t>
+              <a:t>2018. 6. 14.</a:t>
             </a:fld>
             <a:endParaRPr kumimoji="1" lang="ko-KR" altLang="en-US"/>
           </a:p>
@@ -3430,7 +3435,11 @@
           <a:p>
             <a:r>
               <a:rPr kumimoji="1" lang="en-US" altLang="ko-KR" b="1" dirty="0" smtClean="0"/>
-              <a:t>Anti-Methods for Distributed Web-Crawler</a:t>
+              <a:t>Detection Methods </a:t>
+            </a:r>
+            <a:r>
+              <a:rPr kumimoji="1" lang="en-US" altLang="ko-KR" b="1" dirty="0" smtClean="0"/>
+              <a:t>for Distributed Web-Crawler</a:t>
             </a:r>
             <a:r>
               <a:rPr kumimoji="1" lang="en-US" altLang="ko-KR" dirty="0" smtClean="0"/>
@@ -3768,27 +3777,19 @@
               <a:t>Long-tail Threshold </a:t>
             </a:r>
             <a:r>
-              <a:rPr kumimoji="1" lang="ko-KR" altLang="en-US" dirty="0" smtClean="0"/>
+              <a:rPr kumimoji="1" lang="ko-KR" altLang="en-US" smtClean="0"/>
               <a:t>모델</a:t>
             </a:r>
             <a:endParaRPr kumimoji="1" lang="en-US" altLang="ko-KR" dirty="0" smtClean="0"/>
           </a:p>
           <a:p>
-            <a:pPr lvl="1"/>
-            <a:r>
-              <a:rPr kumimoji="1" lang="en-US" altLang="ko-KR" dirty="0" smtClean="0"/>
-              <a:t>Node Reducing</a:t>
-            </a:r>
-            <a:r>
-              <a:rPr kumimoji="1" lang="ko-KR" altLang="en-US" dirty="0" smtClean="0"/>
-              <a:t> 접근법</a:t>
-            </a:r>
-            <a:endParaRPr kumimoji="1" lang="en-US" altLang="ko-KR" dirty="0" smtClean="0"/>
-          </a:p>
-          <a:p>
-            <a:r>
-              <a:rPr kumimoji="1" lang="ko-KR" altLang="en-US" dirty="0" smtClean="0"/>
-              <a:t>실험 및 분석</a:t>
+            <a:r>
+              <a:rPr kumimoji="1" lang="ko-KR" altLang="en-US" dirty="0" smtClean="0"/>
+              <a:t>분석 </a:t>
+            </a:r>
+            <a:r>
+              <a:rPr kumimoji="1" lang="ko-KR" altLang="en-US" dirty="0" smtClean="0"/>
+              <a:t>및 실험</a:t>
             </a:r>
             <a:endParaRPr kumimoji="1" lang="en-US" altLang="ko-KR" dirty="0" smtClean="0"/>
           </a:p>
@@ -4725,15 +4726,15 @@
           <a:p>
             <a:r>
               <a:rPr kumimoji="1" lang="ko-KR" altLang="en-US" dirty="0" smtClean="0"/>
-              <a:t>분석 </a:t>
-            </a:r>
-            <a:r>
-              <a:rPr kumimoji="1" lang="en-US" altLang="ko-KR" dirty="0" smtClean="0"/>
-              <a:t>-</a:t>
-            </a:r>
-            <a:r>
-              <a:rPr kumimoji="1" lang="ko-KR" altLang="en-US" dirty="0" smtClean="0"/>
-              <a:t> 시뮬레이션</a:t>
+              <a:t>실험 </a:t>
+            </a:r>
+            <a:r>
+              <a:rPr kumimoji="1" lang="mr-IN" altLang="ko-KR" dirty="0" smtClean="0"/>
+              <a:t>–</a:t>
+            </a:r>
+            <a:r>
+              <a:rPr kumimoji="1" lang="ko-KR" altLang="en-US" dirty="0" smtClean="0"/>
+              <a:t> 분산 크롤링 시뮬레이션</a:t>
             </a:r>
             <a:endParaRPr kumimoji="1" lang="ko-KR" altLang="en-US" dirty="0"/>
           </a:p>
@@ -5003,6 +5004,66 @@
           </a:prstGeom>
         </p:spPr>
       </p:pic>
+      <p:sp>
+        <p:nvSpPr>
+          <p:cNvPr id="7" name="TextBox 6"/>
+          <p:cNvSpPr txBox="1"/>
+          <p:nvPr/>
+        </p:nvSpPr>
+        <p:spPr>
+          <a:xfrm>
+            <a:off x="6333893" y="2219093"/>
+            <a:ext cx="1557799" cy="369332"/>
+          </a:xfrm>
+          <a:prstGeom prst="rect">
+            <a:avLst/>
+          </a:prstGeom>
+          <a:noFill/>
+        </p:spPr>
+        <p:txBody>
+          <a:bodyPr wrap="none" rtlCol="0">
+            <a:spAutoFit/>
+          </a:bodyPr>
+          <a:lstStyle/>
+          <a:p>
+            <a:r>
+              <a:rPr kumimoji="1" lang="en-US" altLang="ko-KR" smtClean="0"/>
+              <a:t>False Positive</a:t>
+            </a:r>
+            <a:endParaRPr kumimoji="1" lang="ko-KR" altLang="en-US" dirty="0"/>
+          </a:p>
+        </p:txBody>
+      </p:sp>
+      <p:sp>
+        <p:nvSpPr>
+          <p:cNvPr id="8" name="TextBox 7"/>
+          <p:cNvSpPr txBox="1"/>
+          <p:nvPr/>
+        </p:nvSpPr>
+        <p:spPr>
+          <a:xfrm>
+            <a:off x="9982200" y="5923699"/>
+            <a:ext cx="1208985" cy="369332"/>
+          </a:xfrm>
+          <a:prstGeom prst="rect">
+            <a:avLst/>
+          </a:prstGeom>
+          <a:noFill/>
+        </p:spPr>
+        <p:txBody>
+          <a:bodyPr wrap="none" rtlCol="0">
+            <a:spAutoFit/>
+          </a:bodyPr>
+          <a:lstStyle/>
+          <a:p>
+            <a:r>
+              <a:rPr kumimoji="1" lang="en-US" altLang="ko-KR" smtClean="0"/>
+              <a:t>Threshold</a:t>
+            </a:r>
+            <a:endParaRPr kumimoji="1" lang="ko-KR" altLang="en-US" dirty="0"/>
+          </a:p>
+        </p:txBody>
+      </p:sp>
     </p:spTree>
     <p:extLst>
       <p:ext uri="{BB962C8B-B14F-4D97-AF65-F5344CB8AC3E}">

</xml_diff>